<commit_message>
Fixed presentatie en kleine script update
</commit_message>
<xml_diff>
--- a/SCRUM files/SCRUM Presentatie/SCRUM presentatie.pptx
+++ b/SCRUM files/SCRUM Presentatie/SCRUM presentatie.pptx
@@ -4,16 +4,18 @@
   <p:sldMasterIdLst>
     <p:sldMasterId id="2147483648" r:id="rId2"/>
     <p:sldMasterId id="2147483661" r:id="rId3"/>
+    <p:sldMasterId id="2147483674" r:id="rId4"/>
   </p:sldMasterIdLst>
   <p:sldIdLst>
-    <p:sldId id="256" r:id="rId4"/>
-    <p:sldId id="257" r:id="rId5"/>
-    <p:sldId id="258" r:id="rId6"/>
-    <p:sldId id="259" r:id="rId7"/>
-    <p:sldId id="260" r:id="rId8"/>
-    <p:sldId id="261" r:id="rId9"/>
-    <p:sldId id="262" r:id="rId10"/>
-    <p:sldId id="263" r:id="rId11"/>
+    <p:sldId id="256" r:id="rId5"/>
+    <p:sldId id="257" r:id="rId6"/>
+    <p:sldId id="258" r:id="rId7"/>
+    <p:sldId id="259" r:id="rId8"/>
+    <p:sldId id="260" r:id="rId9"/>
+    <p:sldId id="261" r:id="rId10"/>
+    <p:sldId id="262" r:id="rId11"/>
+    <p:sldId id="263" r:id="rId12"/>
+    <p:sldId id="264" r:id="rId13"/>
   </p:sldIdLst>
   <p:sldSz cx="10080625" cy="5670550"/>
   <p:notesSz cx="7559675" cy="10691812"/>
@@ -1967,6 +1969,351 @@
 </p:sldLayout>
 </file>
 
+<file path=ppt/slideLayouts/slideLayout25.xml><?xml version="1.0" encoding="utf-8"?>
+<p:sldLayout xmlns:a="http://schemas.openxmlformats.org/drawingml/2006/main" xmlns:p="http://schemas.openxmlformats.org/presentationml/2006/main" xmlns:r="http://schemas.openxmlformats.org/officeDocument/2006/relationships" xmlns:p14="http://schemas.microsoft.com/office/powerpoint/2010/main" xmlns:p15="http://schemas.microsoft.com/office/powerpoint/2012/main" xmlns:mc="http://schemas.openxmlformats.org/markup-compatibility/2006" type="blank" preserve="1">
+  <p:cSld name="Blank Slide">
+    <p:spTree>
+      <p:nvGrpSpPr>
+        <p:cNvPr id="1" name=""/>
+        <p:cNvGrpSpPr/>
+        <p:nvPr/>
+      </p:nvGrpSpPr>
+      <p:grpSpPr>
+        <a:xfrm>
+          <a:off x="0" y="0"/>
+          <a:ext cx="0" cy="0"/>
+          <a:chOff x="0" y="0"/>
+          <a:chExt cx="0" cy="0"/>
+        </a:xfrm>
+      </p:grpSpPr>
+    </p:spTree>
+  </p:cSld>
+</p:sldLayout>
+</file>
+
+<file path=ppt/slideLayouts/slideLayout26.xml><?xml version="1.0" encoding="utf-8"?>
+<p:sldLayout xmlns:a="http://schemas.openxmlformats.org/drawingml/2006/main" xmlns:p="http://schemas.openxmlformats.org/presentationml/2006/main" xmlns:r="http://schemas.openxmlformats.org/officeDocument/2006/relationships" xmlns:p14="http://schemas.microsoft.com/office/powerpoint/2010/main" xmlns:p15="http://schemas.microsoft.com/office/powerpoint/2012/main" xmlns:mc="http://schemas.openxmlformats.org/markup-compatibility/2006" type="tx" preserve="1">
+  <p:cSld name="Title Slide">
+    <p:spTree>
+      <p:nvGrpSpPr>
+        <p:cNvPr id="1" name=""/>
+        <p:cNvGrpSpPr/>
+        <p:nvPr/>
+      </p:nvGrpSpPr>
+      <p:grpSpPr>
+        <a:xfrm>
+          <a:off x="0" y="0"/>
+          <a:ext cx="0" cy="0"/>
+          <a:chOff x="0" y="0"/>
+          <a:chExt cx="0" cy="0"/>
+        </a:xfrm>
+      </p:grpSpPr>
+      <p:sp>
+        <p:nvSpPr>
+          <p:cNvPr id="85" name="PlaceHolder 1"/>
+          <p:cNvSpPr>
+            <a:spLocks noGrp="1"/>
+          </p:cNvSpPr>
+          <p:nvPr>
+            <p:ph type="title"/>
+          </p:nvPr>
+        </p:nvSpPr>
+        <p:spPr>
+          <a:xfrm>
+            <a:off x="504000" y="226080"/>
+            <a:ext cx="9072000" cy="946440"/>
+          </a:xfrm>
+          <a:prstGeom prst="rect">
+            <a:avLst/>
+          </a:prstGeom>
+        </p:spPr>
+        <p:txBody>
+          <a:bodyPr lIns="0" rIns="0" tIns="0" bIns="0" anchor="ctr"/>
+          <a:p>
+            <a:pPr algn="ctr"/>
+            <a:endParaRPr b="0" lang="nl-NL" sz="4400" spc="-1" strike="noStrike">
+              <a:latin typeface="Arial"/>
+            </a:endParaRPr>
+          </a:p>
+        </p:txBody>
+      </p:sp>
+      <p:sp>
+        <p:nvSpPr>
+          <p:cNvPr id="86" name="PlaceHolder 2"/>
+          <p:cNvSpPr>
+            <a:spLocks noGrp="1"/>
+          </p:cNvSpPr>
+          <p:nvPr>
+            <p:ph type="subTitle"/>
+          </p:nvPr>
+        </p:nvSpPr>
+        <p:spPr>
+          <a:xfrm>
+            <a:off x="504000" y="1326600"/>
+            <a:ext cx="9072000" cy="3288600"/>
+          </a:xfrm>
+          <a:prstGeom prst="rect">
+            <a:avLst/>
+          </a:prstGeom>
+        </p:spPr>
+        <p:txBody>
+          <a:bodyPr lIns="0" rIns="0" tIns="0" bIns="0" anchor="ctr"/>
+          <a:p>
+            <a:pPr algn="ctr"/>
+            <a:endParaRPr b="0" lang="nl-NL" sz="3200" spc="-1" strike="noStrike">
+              <a:latin typeface="Arial"/>
+            </a:endParaRPr>
+          </a:p>
+        </p:txBody>
+      </p:sp>
+    </p:spTree>
+  </p:cSld>
+</p:sldLayout>
+</file>
+
+<file path=ppt/slideLayouts/slideLayout27.xml><?xml version="1.0" encoding="utf-8"?>
+<p:sldLayout xmlns:a="http://schemas.openxmlformats.org/drawingml/2006/main" xmlns:p="http://schemas.openxmlformats.org/presentationml/2006/main" xmlns:r="http://schemas.openxmlformats.org/officeDocument/2006/relationships" xmlns:p14="http://schemas.microsoft.com/office/powerpoint/2010/main" xmlns:p15="http://schemas.microsoft.com/office/powerpoint/2012/main" xmlns:mc="http://schemas.openxmlformats.org/markup-compatibility/2006" type="obj" preserve="1">
+  <p:cSld name="Title, Content">
+    <p:spTree>
+      <p:nvGrpSpPr>
+        <p:cNvPr id="1" name=""/>
+        <p:cNvGrpSpPr/>
+        <p:nvPr/>
+      </p:nvGrpSpPr>
+      <p:grpSpPr>
+        <a:xfrm>
+          <a:off x="0" y="0"/>
+          <a:ext cx="0" cy="0"/>
+          <a:chOff x="0" y="0"/>
+          <a:chExt cx="0" cy="0"/>
+        </a:xfrm>
+      </p:grpSpPr>
+      <p:sp>
+        <p:nvSpPr>
+          <p:cNvPr id="87" name="PlaceHolder 1"/>
+          <p:cNvSpPr>
+            <a:spLocks noGrp="1"/>
+          </p:cNvSpPr>
+          <p:nvPr>
+            <p:ph type="title"/>
+          </p:nvPr>
+        </p:nvSpPr>
+        <p:spPr>
+          <a:xfrm>
+            <a:off x="504000" y="226080"/>
+            <a:ext cx="9072000" cy="946440"/>
+          </a:xfrm>
+          <a:prstGeom prst="rect">
+            <a:avLst/>
+          </a:prstGeom>
+        </p:spPr>
+        <p:txBody>
+          <a:bodyPr lIns="0" rIns="0" tIns="0" bIns="0" anchor="ctr"/>
+          <a:p>
+            <a:pPr algn="ctr"/>
+            <a:endParaRPr b="0" lang="nl-NL" sz="4400" spc="-1" strike="noStrike">
+              <a:latin typeface="Arial"/>
+            </a:endParaRPr>
+          </a:p>
+        </p:txBody>
+      </p:sp>
+      <p:sp>
+        <p:nvSpPr>
+          <p:cNvPr id="88" name="PlaceHolder 2"/>
+          <p:cNvSpPr>
+            <a:spLocks noGrp="1"/>
+          </p:cNvSpPr>
+          <p:nvPr>
+            <p:ph type="body"/>
+          </p:nvPr>
+        </p:nvSpPr>
+        <p:spPr>
+          <a:xfrm>
+            <a:off x="504000" y="1326600"/>
+            <a:ext cx="9072000" cy="3288600"/>
+          </a:xfrm>
+          <a:prstGeom prst="rect">
+            <a:avLst/>
+          </a:prstGeom>
+        </p:spPr>
+        <p:txBody>
+          <a:bodyPr lIns="0" rIns="0" tIns="0" bIns="0">
+            <a:normAutofit/>
+          </a:bodyPr>
+          <a:p>
+            <a:endParaRPr b="0" lang="nl-NL" sz="3200" spc="-1" strike="noStrike">
+              <a:latin typeface="Arial"/>
+            </a:endParaRPr>
+          </a:p>
+        </p:txBody>
+      </p:sp>
+    </p:spTree>
+  </p:cSld>
+</p:sldLayout>
+</file>
+
+<file path=ppt/slideLayouts/slideLayout28.xml><?xml version="1.0" encoding="utf-8"?>
+<p:sldLayout xmlns:a="http://schemas.openxmlformats.org/drawingml/2006/main" xmlns:p="http://schemas.openxmlformats.org/presentationml/2006/main" xmlns:r="http://schemas.openxmlformats.org/officeDocument/2006/relationships" xmlns:p14="http://schemas.microsoft.com/office/powerpoint/2010/main" xmlns:p15="http://schemas.microsoft.com/office/powerpoint/2012/main" xmlns:mc="http://schemas.openxmlformats.org/markup-compatibility/2006" type="twoObj" preserve="1">
+  <p:cSld name="Title, 2 Content">
+    <p:spTree>
+      <p:nvGrpSpPr>
+        <p:cNvPr id="1" name=""/>
+        <p:cNvGrpSpPr/>
+        <p:nvPr/>
+      </p:nvGrpSpPr>
+      <p:grpSpPr>
+        <a:xfrm>
+          <a:off x="0" y="0"/>
+          <a:ext cx="0" cy="0"/>
+          <a:chOff x="0" y="0"/>
+          <a:chExt cx="0" cy="0"/>
+        </a:xfrm>
+      </p:grpSpPr>
+      <p:sp>
+        <p:nvSpPr>
+          <p:cNvPr id="89" name="PlaceHolder 1"/>
+          <p:cNvSpPr>
+            <a:spLocks noGrp="1"/>
+          </p:cNvSpPr>
+          <p:nvPr>
+            <p:ph type="title"/>
+          </p:nvPr>
+        </p:nvSpPr>
+        <p:spPr>
+          <a:xfrm>
+            <a:off x="504000" y="226080"/>
+            <a:ext cx="9072000" cy="946440"/>
+          </a:xfrm>
+          <a:prstGeom prst="rect">
+            <a:avLst/>
+          </a:prstGeom>
+        </p:spPr>
+        <p:txBody>
+          <a:bodyPr lIns="0" rIns="0" tIns="0" bIns="0" anchor="ctr"/>
+          <a:p>
+            <a:pPr algn="ctr"/>
+            <a:endParaRPr b="0" lang="nl-NL" sz="4400" spc="-1" strike="noStrike">
+              <a:latin typeface="Arial"/>
+            </a:endParaRPr>
+          </a:p>
+        </p:txBody>
+      </p:sp>
+      <p:sp>
+        <p:nvSpPr>
+          <p:cNvPr id="90" name="PlaceHolder 2"/>
+          <p:cNvSpPr>
+            <a:spLocks noGrp="1"/>
+          </p:cNvSpPr>
+          <p:nvPr>
+            <p:ph type="body"/>
+          </p:nvPr>
+        </p:nvSpPr>
+        <p:spPr>
+          <a:xfrm>
+            <a:off x="504000" y="1326600"/>
+            <a:ext cx="4426920" cy="3288600"/>
+          </a:xfrm>
+          <a:prstGeom prst="rect">
+            <a:avLst/>
+          </a:prstGeom>
+        </p:spPr>
+        <p:txBody>
+          <a:bodyPr lIns="0" rIns="0" tIns="0" bIns="0">
+            <a:normAutofit/>
+          </a:bodyPr>
+          <a:p>
+            <a:endParaRPr b="0" lang="nl-NL" sz="3200" spc="-1" strike="noStrike">
+              <a:latin typeface="Arial"/>
+            </a:endParaRPr>
+          </a:p>
+        </p:txBody>
+      </p:sp>
+      <p:sp>
+        <p:nvSpPr>
+          <p:cNvPr id="91" name="PlaceHolder 3"/>
+          <p:cNvSpPr>
+            <a:spLocks noGrp="1"/>
+          </p:cNvSpPr>
+          <p:nvPr>
+            <p:ph type="body"/>
+          </p:nvPr>
+        </p:nvSpPr>
+        <p:spPr>
+          <a:xfrm>
+            <a:off x="5152680" y="1326600"/>
+            <a:ext cx="4426920" cy="3288600"/>
+          </a:xfrm>
+          <a:prstGeom prst="rect">
+            <a:avLst/>
+          </a:prstGeom>
+        </p:spPr>
+        <p:txBody>
+          <a:bodyPr lIns="0" rIns="0" tIns="0" bIns="0">
+            <a:normAutofit/>
+          </a:bodyPr>
+          <a:p>
+            <a:endParaRPr b="0" lang="nl-NL" sz="3200" spc="-1" strike="noStrike">
+              <a:latin typeface="Arial"/>
+            </a:endParaRPr>
+          </a:p>
+        </p:txBody>
+      </p:sp>
+    </p:spTree>
+  </p:cSld>
+</p:sldLayout>
+</file>
+
+<file path=ppt/slideLayouts/slideLayout29.xml><?xml version="1.0" encoding="utf-8"?>
+<p:sldLayout xmlns:a="http://schemas.openxmlformats.org/drawingml/2006/main" xmlns:p="http://schemas.openxmlformats.org/presentationml/2006/main" xmlns:r="http://schemas.openxmlformats.org/officeDocument/2006/relationships" xmlns:p14="http://schemas.microsoft.com/office/powerpoint/2010/main" xmlns:p15="http://schemas.microsoft.com/office/powerpoint/2012/main" xmlns:mc="http://schemas.openxmlformats.org/markup-compatibility/2006" type="titleOnly" preserve="1">
+  <p:cSld name="Title Only">
+    <p:spTree>
+      <p:nvGrpSpPr>
+        <p:cNvPr id="1" name=""/>
+        <p:cNvGrpSpPr/>
+        <p:nvPr/>
+      </p:nvGrpSpPr>
+      <p:grpSpPr>
+        <a:xfrm>
+          <a:off x="0" y="0"/>
+          <a:ext cx="0" cy="0"/>
+          <a:chOff x="0" y="0"/>
+          <a:chExt cx="0" cy="0"/>
+        </a:xfrm>
+      </p:grpSpPr>
+      <p:sp>
+        <p:nvSpPr>
+          <p:cNvPr id="92" name="PlaceHolder 1"/>
+          <p:cNvSpPr>
+            <a:spLocks noGrp="1"/>
+          </p:cNvSpPr>
+          <p:nvPr>
+            <p:ph type="title"/>
+          </p:nvPr>
+        </p:nvSpPr>
+        <p:spPr>
+          <a:xfrm>
+            <a:off x="504000" y="226080"/>
+            <a:ext cx="9072000" cy="946440"/>
+          </a:xfrm>
+          <a:prstGeom prst="rect">
+            <a:avLst/>
+          </a:prstGeom>
+        </p:spPr>
+        <p:txBody>
+          <a:bodyPr lIns="0" rIns="0" tIns="0" bIns="0" anchor="ctr"/>
+          <a:p>
+            <a:pPr algn="ctr"/>
+            <a:endParaRPr b="0" lang="nl-NL" sz="4400" spc="-1" strike="noStrike">
+              <a:latin typeface="Arial"/>
+            </a:endParaRPr>
+          </a:p>
+        </p:txBody>
+      </p:sp>
+    </p:spTree>
+  </p:cSld>
+</p:sldLayout>
+</file>
+
 <file path=ppt/slideLayouts/slideLayout3.xml><?xml version="1.0" encoding="utf-8"?>
 <p:sldLayout xmlns:a="http://schemas.openxmlformats.org/drawingml/2006/main" xmlns:p="http://schemas.openxmlformats.org/presentationml/2006/main" xmlns:r="http://schemas.openxmlformats.org/officeDocument/2006/relationships" xmlns:p14="http://schemas.microsoft.com/office/powerpoint/2010/main" xmlns:p15="http://schemas.microsoft.com/office/powerpoint/2012/main" xmlns:mc="http://schemas.openxmlformats.org/markup-compatibility/2006" type="obj" preserve="1">
   <p:cSld name="Title, Content">
@@ -2027,6 +2374,993 @@
           <a:xfrm>
             <a:off x="504000" y="1326600"/>
             <a:ext cx="9072000" cy="3288600"/>
+          </a:xfrm>
+          <a:prstGeom prst="rect">
+            <a:avLst/>
+          </a:prstGeom>
+        </p:spPr>
+        <p:txBody>
+          <a:bodyPr lIns="0" rIns="0" tIns="0" bIns="0">
+            <a:normAutofit/>
+          </a:bodyPr>
+          <a:p>
+            <a:endParaRPr b="0" lang="nl-NL" sz="3200" spc="-1" strike="noStrike">
+              <a:latin typeface="Arial"/>
+            </a:endParaRPr>
+          </a:p>
+        </p:txBody>
+      </p:sp>
+    </p:spTree>
+  </p:cSld>
+</p:sldLayout>
+</file>
+
+<file path=ppt/slideLayouts/slideLayout30.xml><?xml version="1.0" encoding="utf-8"?>
+<p:sldLayout xmlns:a="http://schemas.openxmlformats.org/drawingml/2006/main" xmlns:p="http://schemas.openxmlformats.org/presentationml/2006/main" xmlns:r="http://schemas.openxmlformats.org/officeDocument/2006/relationships" xmlns:p14="http://schemas.microsoft.com/office/powerpoint/2010/main" xmlns:p15="http://schemas.microsoft.com/office/powerpoint/2012/main" xmlns:mc="http://schemas.openxmlformats.org/markup-compatibility/2006" type="objOnly" preserve="1">
+  <p:cSld name="Centered Text">
+    <p:spTree>
+      <p:nvGrpSpPr>
+        <p:cNvPr id="1" name=""/>
+        <p:cNvGrpSpPr/>
+        <p:nvPr/>
+      </p:nvGrpSpPr>
+      <p:grpSpPr>
+        <a:xfrm>
+          <a:off x="0" y="0"/>
+          <a:ext cx="0" cy="0"/>
+          <a:chOff x="0" y="0"/>
+          <a:chExt cx="0" cy="0"/>
+        </a:xfrm>
+      </p:grpSpPr>
+      <p:sp>
+        <p:nvSpPr>
+          <p:cNvPr id="93" name="PlaceHolder 1"/>
+          <p:cNvSpPr>
+            <a:spLocks noGrp="1"/>
+          </p:cNvSpPr>
+          <p:nvPr>
+            <p:ph type="subTitle"/>
+          </p:nvPr>
+        </p:nvSpPr>
+        <p:spPr>
+          <a:xfrm>
+            <a:off x="504000" y="226080"/>
+            <a:ext cx="9072000" cy="4388400"/>
+          </a:xfrm>
+          <a:prstGeom prst="rect">
+            <a:avLst/>
+          </a:prstGeom>
+        </p:spPr>
+        <p:txBody>
+          <a:bodyPr lIns="0" rIns="0" tIns="0" bIns="0" anchor="ctr"/>
+          <a:p>
+            <a:pPr algn="ctr"/>
+            <a:endParaRPr b="0" lang="nl-NL" sz="3200" spc="-1" strike="noStrike">
+              <a:latin typeface="Arial"/>
+            </a:endParaRPr>
+          </a:p>
+        </p:txBody>
+      </p:sp>
+    </p:spTree>
+  </p:cSld>
+</p:sldLayout>
+</file>
+
+<file path=ppt/slideLayouts/slideLayout31.xml><?xml version="1.0" encoding="utf-8"?>
+<p:sldLayout xmlns:a="http://schemas.openxmlformats.org/drawingml/2006/main" xmlns:p="http://schemas.openxmlformats.org/presentationml/2006/main" xmlns:r="http://schemas.openxmlformats.org/officeDocument/2006/relationships" xmlns:p14="http://schemas.microsoft.com/office/powerpoint/2010/main" xmlns:p15="http://schemas.microsoft.com/office/powerpoint/2012/main" xmlns:mc="http://schemas.openxmlformats.org/markup-compatibility/2006" type="twoObjAndObj" preserve="1">
+  <p:cSld name="Title, 2 Content and Content">
+    <p:spTree>
+      <p:nvGrpSpPr>
+        <p:cNvPr id="1" name=""/>
+        <p:cNvGrpSpPr/>
+        <p:nvPr/>
+      </p:nvGrpSpPr>
+      <p:grpSpPr>
+        <a:xfrm>
+          <a:off x="0" y="0"/>
+          <a:ext cx="0" cy="0"/>
+          <a:chOff x="0" y="0"/>
+          <a:chExt cx="0" cy="0"/>
+        </a:xfrm>
+      </p:grpSpPr>
+      <p:sp>
+        <p:nvSpPr>
+          <p:cNvPr id="94" name="PlaceHolder 1"/>
+          <p:cNvSpPr>
+            <a:spLocks noGrp="1"/>
+          </p:cNvSpPr>
+          <p:nvPr>
+            <p:ph type="title"/>
+          </p:nvPr>
+        </p:nvSpPr>
+        <p:spPr>
+          <a:xfrm>
+            <a:off x="504000" y="226080"/>
+            <a:ext cx="9072000" cy="946440"/>
+          </a:xfrm>
+          <a:prstGeom prst="rect">
+            <a:avLst/>
+          </a:prstGeom>
+        </p:spPr>
+        <p:txBody>
+          <a:bodyPr lIns="0" rIns="0" tIns="0" bIns="0" anchor="ctr"/>
+          <a:p>
+            <a:pPr algn="ctr"/>
+            <a:endParaRPr b="0" lang="nl-NL" sz="4400" spc="-1" strike="noStrike">
+              <a:latin typeface="Arial"/>
+            </a:endParaRPr>
+          </a:p>
+        </p:txBody>
+      </p:sp>
+      <p:sp>
+        <p:nvSpPr>
+          <p:cNvPr id="95" name="PlaceHolder 2"/>
+          <p:cNvSpPr>
+            <a:spLocks noGrp="1"/>
+          </p:cNvSpPr>
+          <p:nvPr>
+            <p:ph type="body"/>
+          </p:nvPr>
+        </p:nvSpPr>
+        <p:spPr>
+          <a:xfrm>
+            <a:off x="504000" y="1326600"/>
+            <a:ext cx="4426920" cy="1568520"/>
+          </a:xfrm>
+          <a:prstGeom prst="rect">
+            <a:avLst/>
+          </a:prstGeom>
+        </p:spPr>
+        <p:txBody>
+          <a:bodyPr lIns="0" rIns="0" tIns="0" bIns="0">
+            <a:normAutofit/>
+          </a:bodyPr>
+          <a:p>
+            <a:endParaRPr b="0" lang="nl-NL" sz="3200" spc="-1" strike="noStrike">
+              <a:latin typeface="Arial"/>
+            </a:endParaRPr>
+          </a:p>
+        </p:txBody>
+      </p:sp>
+      <p:sp>
+        <p:nvSpPr>
+          <p:cNvPr id="96" name="PlaceHolder 3"/>
+          <p:cNvSpPr>
+            <a:spLocks noGrp="1"/>
+          </p:cNvSpPr>
+          <p:nvPr>
+            <p:ph type="body"/>
+          </p:nvPr>
+        </p:nvSpPr>
+        <p:spPr>
+          <a:xfrm>
+            <a:off x="504000" y="3044520"/>
+            <a:ext cx="4426920" cy="1568520"/>
+          </a:xfrm>
+          <a:prstGeom prst="rect">
+            <a:avLst/>
+          </a:prstGeom>
+        </p:spPr>
+        <p:txBody>
+          <a:bodyPr lIns="0" rIns="0" tIns="0" bIns="0">
+            <a:normAutofit/>
+          </a:bodyPr>
+          <a:p>
+            <a:endParaRPr b="0" lang="nl-NL" sz="3200" spc="-1" strike="noStrike">
+              <a:latin typeface="Arial"/>
+            </a:endParaRPr>
+          </a:p>
+        </p:txBody>
+      </p:sp>
+      <p:sp>
+        <p:nvSpPr>
+          <p:cNvPr id="97" name="PlaceHolder 4"/>
+          <p:cNvSpPr>
+            <a:spLocks noGrp="1"/>
+          </p:cNvSpPr>
+          <p:nvPr>
+            <p:ph type="body"/>
+          </p:nvPr>
+        </p:nvSpPr>
+        <p:spPr>
+          <a:xfrm>
+            <a:off x="5152680" y="1326600"/>
+            <a:ext cx="4426920" cy="3288600"/>
+          </a:xfrm>
+          <a:prstGeom prst="rect">
+            <a:avLst/>
+          </a:prstGeom>
+        </p:spPr>
+        <p:txBody>
+          <a:bodyPr lIns="0" rIns="0" tIns="0" bIns="0">
+            <a:normAutofit/>
+          </a:bodyPr>
+          <a:p>
+            <a:endParaRPr b="0" lang="nl-NL" sz="3200" spc="-1" strike="noStrike">
+              <a:latin typeface="Arial"/>
+            </a:endParaRPr>
+          </a:p>
+        </p:txBody>
+      </p:sp>
+    </p:spTree>
+  </p:cSld>
+</p:sldLayout>
+</file>
+
+<file path=ppt/slideLayouts/slideLayout32.xml><?xml version="1.0" encoding="utf-8"?>
+<p:sldLayout xmlns:a="http://schemas.openxmlformats.org/drawingml/2006/main" xmlns:p="http://schemas.openxmlformats.org/presentationml/2006/main" xmlns:r="http://schemas.openxmlformats.org/officeDocument/2006/relationships" xmlns:p14="http://schemas.microsoft.com/office/powerpoint/2010/main" xmlns:p15="http://schemas.microsoft.com/office/powerpoint/2012/main" xmlns:mc="http://schemas.openxmlformats.org/markup-compatibility/2006" type="objAndTwoObj" preserve="1">
+  <p:cSld name="Title Content and 2 Content">
+    <p:spTree>
+      <p:nvGrpSpPr>
+        <p:cNvPr id="1" name=""/>
+        <p:cNvGrpSpPr/>
+        <p:nvPr/>
+      </p:nvGrpSpPr>
+      <p:grpSpPr>
+        <a:xfrm>
+          <a:off x="0" y="0"/>
+          <a:ext cx="0" cy="0"/>
+          <a:chOff x="0" y="0"/>
+          <a:chExt cx="0" cy="0"/>
+        </a:xfrm>
+      </p:grpSpPr>
+      <p:sp>
+        <p:nvSpPr>
+          <p:cNvPr id="98" name="PlaceHolder 1"/>
+          <p:cNvSpPr>
+            <a:spLocks noGrp="1"/>
+          </p:cNvSpPr>
+          <p:nvPr>
+            <p:ph type="title"/>
+          </p:nvPr>
+        </p:nvSpPr>
+        <p:spPr>
+          <a:xfrm>
+            <a:off x="504000" y="226080"/>
+            <a:ext cx="9072000" cy="946440"/>
+          </a:xfrm>
+          <a:prstGeom prst="rect">
+            <a:avLst/>
+          </a:prstGeom>
+        </p:spPr>
+        <p:txBody>
+          <a:bodyPr lIns="0" rIns="0" tIns="0" bIns="0" anchor="ctr"/>
+          <a:p>
+            <a:pPr algn="ctr"/>
+            <a:endParaRPr b="0" lang="nl-NL" sz="4400" spc="-1" strike="noStrike">
+              <a:latin typeface="Arial"/>
+            </a:endParaRPr>
+          </a:p>
+        </p:txBody>
+      </p:sp>
+      <p:sp>
+        <p:nvSpPr>
+          <p:cNvPr id="99" name="PlaceHolder 2"/>
+          <p:cNvSpPr>
+            <a:spLocks noGrp="1"/>
+          </p:cNvSpPr>
+          <p:nvPr>
+            <p:ph type="body"/>
+          </p:nvPr>
+        </p:nvSpPr>
+        <p:spPr>
+          <a:xfrm>
+            <a:off x="504000" y="1326600"/>
+            <a:ext cx="4426920" cy="3288600"/>
+          </a:xfrm>
+          <a:prstGeom prst="rect">
+            <a:avLst/>
+          </a:prstGeom>
+        </p:spPr>
+        <p:txBody>
+          <a:bodyPr lIns="0" rIns="0" tIns="0" bIns="0">
+            <a:normAutofit/>
+          </a:bodyPr>
+          <a:p>
+            <a:endParaRPr b="0" lang="nl-NL" sz="3200" spc="-1" strike="noStrike">
+              <a:latin typeface="Arial"/>
+            </a:endParaRPr>
+          </a:p>
+        </p:txBody>
+      </p:sp>
+      <p:sp>
+        <p:nvSpPr>
+          <p:cNvPr id="100" name="PlaceHolder 3"/>
+          <p:cNvSpPr>
+            <a:spLocks noGrp="1"/>
+          </p:cNvSpPr>
+          <p:nvPr>
+            <p:ph type="body"/>
+          </p:nvPr>
+        </p:nvSpPr>
+        <p:spPr>
+          <a:xfrm>
+            <a:off x="5152680" y="1326600"/>
+            <a:ext cx="4426920" cy="1568520"/>
+          </a:xfrm>
+          <a:prstGeom prst="rect">
+            <a:avLst/>
+          </a:prstGeom>
+        </p:spPr>
+        <p:txBody>
+          <a:bodyPr lIns="0" rIns="0" tIns="0" bIns="0">
+            <a:normAutofit/>
+          </a:bodyPr>
+          <a:p>
+            <a:endParaRPr b="0" lang="nl-NL" sz="3200" spc="-1" strike="noStrike">
+              <a:latin typeface="Arial"/>
+            </a:endParaRPr>
+          </a:p>
+        </p:txBody>
+      </p:sp>
+      <p:sp>
+        <p:nvSpPr>
+          <p:cNvPr id="101" name="PlaceHolder 4"/>
+          <p:cNvSpPr>
+            <a:spLocks noGrp="1"/>
+          </p:cNvSpPr>
+          <p:nvPr>
+            <p:ph type="body"/>
+          </p:nvPr>
+        </p:nvSpPr>
+        <p:spPr>
+          <a:xfrm>
+            <a:off x="5152680" y="3044520"/>
+            <a:ext cx="4426920" cy="1568520"/>
+          </a:xfrm>
+          <a:prstGeom prst="rect">
+            <a:avLst/>
+          </a:prstGeom>
+        </p:spPr>
+        <p:txBody>
+          <a:bodyPr lIns="0" rIns="0" tIns="0" bIns="0">
+            <a:normAutofit/>
+          </a:bodyPr>
+          <a:p>
+            <a:endParaRPr b="0" lang="nl-NL" sz="3200" spc="-1" strike="noStrike">
+              <a:latin typeface="Arial"/>
+            </a:endParaRPr>
+          </a:p>
+        </p:txBody>
+      </p:sp>
+    </p:spTree>
+  </p:cSld>
+</p:sldLayout>
+</file>
+
+<file path=ppt/slideLayouts/slideLayout33.xml><?xml version="1.0" encoding="utf-8"?>
+<p:sldLayout xmlns:a="http://schemas.openxmlformats.org/drawingml/2006/main" xmlns:p="http://schemas.openxmlformats.org/presentationml/2006/main" xmlns:r="http://schemas.openxmlformats.org/officeDocument/2006/relationships" xmlns:p14="http://schemas.microsoft.com/office/powerpoint/2010/main" xmlns:p15="http://schemas.microsoft.com/office/powerpoint/2012/main" xmlns:mc="http://schemas.openxmlformats.org/markup-compatibility/2006" type="twoObjOverTx" preserve="1">
+  <p:cSld name="Title, 2 Content over Content">
+    <p:spTree>
+      <p:nvGrpSpPr>
+        <p:cNvPr id="1" name=""/>
+        <p:cNvGrpSpPr/>
+        <p:nvPr/>
+      </p:nvGrpSpPr>
+      <p:grpSpPr>
+        <a:xfrm>
+          <a:off x="0" y="0"/>
+          <a:ext cx="0" cy="0"/>
+          <a:chOff x="0" y="0"/>
+          <a:chExt cx="0" cy="0"/>
+        </a:xfrm>
+      </p:grpSpPr>
+      <p:sp>
+        <p:nvSpPr>
+          <p:cNvPr id="102" name="PlaceHolder 1"/>
+          <p:cNvSpPr>
+            <a:spLocks noGrp="1"/>
+          </p:cNvSpPr>
+          <p:nvPr>
+            <p:ph type="title"/>
+          </p:nvPr>
+        </p:nvSpPr>
+        <p:spPr>
+          <a:xfrm>
+            <a:off x="504000" y="226080"/>
+            <a:ext cx="9072000" cy="946440"/>
+          </a:xfrm>
+          <a:prstGeom prst="rect">
+            <a:avLst/>
+          </a:prstGeom>
+        </p:spPr>
+        <p:txBody>
+          <a:bodyPr lIns="0" rIns="0" tIns="0" bIns="0" anchor="ctr"/>
+          <a:p>
+            <a:pPr algn="ctr"/>
+            <a:endParaRPr b="0" lang="nl-NL" sz="4400" spc="-1" strike="noStrike">
+              <a:latin typeface="Arial"/>
+            </a:endParaRPr>
+          </a:p>
+        </p:txBody>
+      </p:sp>
+      <p:sp>
+        <p:nvSpPr>
+          <p:cNvPr id="103" name="PlaceHolder 2"/>
+          <p:cNvSpPr>
+            <a:spLocks noGrp="1"/>
+          </p:cNvSpPr>
+          <p:nvPr>
+            <p:ph type="body"/>
+          </p:nvPr>
+        </p:nvSpPr>
+        <p:spPr>
+          <a:xfrm>
+            <a:off x="504000" y="1326600"/>
+            <a:ext cx="4426920" cy="1568520"/>
+          </a:xfrm>
+          <a:prstGeom prst="rect">
+            <a:avLst/>
+          </a:prstGeom>
+        </p:spPr>
+        <p:txBody>
+          <a:bodyPr lIns="0" rIns="0" tIns="0" bIns="0">
+            <a:normAutofit/>
+          </a:bodyPr>
+          <a:p>
+            <a:endParaRPr b="0" lang="nl-NL" sz="3200" spc="-1" strike="noStrike">
+              <a:latin typeface="Arial"/>
+            </a:endParaRPr>
+          </a:p>
+        </p:txBody>
+      </p:sp>
+      <p:sp>
+        <p:nvSpPr>
+          <p:cNvPr id="104" name="PlaceHolder 3"/>
+          <p:cNvSpPr>
+            <a:spLocks noGrp="1"/>
+          </p:cNvSpPr>
+          <p:nvPr>
+            <p:ph type="body"/>
+          </p:nvPr>
+        </p:nvSpPr>
+        <p:spPr>
+          <a:xfrm>
+            <a:off x="5152680" y="1326600"/>
+            <a:ext cx="4426920" cy="1568520"/>
+          </a:xfrm>
+          <a:prstGeom prst="rect">
+            <a:avLst/>
+          </a:prstGeom>
+        </p:spPr>
+        <p:txBody>
+          <a:bodyPr lIns="0" rIns="0" tIns="0" bIns="0">
+            <a:normAutofit/>
+          </a:bodyPr>
+          <a:p>
+            <a:endParaRPr b="0" lang="nl-NL" sz="3200" spc="-1" strike="noStrike">
+              <a:latin typeface="Arial"/>
+            </a:endParaRPr>
+          </a:p>
+        </p:txBody>
+      </p:sp>
+      <p:sp>
+        <p:nvSpPr>
+          <p:cNvPr id="105" name="PlaceHolder 4"/>
+          <p:cNvSpPr>
+            <a:spLocks noGrp="1"/>
+          </p:cNvSpPr>
+          <p:nvPr>
+            <p:ph type="body"/>
+          </p:nvPr>
+        </p:nvSpPr>
+        <p:spPr>
+          <a:xfrm>
+            <a:off x="504000" y="3044520"/>
+            <a:ext cx="9072000" cy="1568520"/>
+          </a:xfrm>
+          <a:prstGeom prst="rect">
+            <a:avLst/>
+          </a:prstGeom>
+        </p:spPr>
+        <p:txBody>
+          <a:bodyPr lIns="0" rIns="0" tIns="0" bIns="0">
+            <a:normAutofit/>
+          </a:bodyPr>
+          <a:p>
+            <a:endParaRPr b="0" lang="nl-NL" sz="3200" spc="-1" strike="noStrike">
+              <a:latin typeface="Arial"/>
+            </a:endParaRPr>
+          </a:p>
+        </p:txBody>
+      </p:sp>
+    </p:spTree>
+  </p:cSld>
+</p:sldLayout>
+</file>
+
+<file path=ppt/slideLayouts/slideLayout34.xml><?xml version="1.0" encoding="utf-8"?>
+<p:sldLayout xmlns:a="http://schemas.openxmlformats.org/drawingml/2006/main" xmlns:p="http://schemas.openxmlformats.org/presentationml/2006/main" xmlns:r="http://schemas.openxmlformats.org/officeDocument/2006/relationships" xmlns:p14="http://schemas.microsoft.com/office/powerpoint/2010/main" xmlns:p15="http://schemas.microsoft.com/office/powerpoint/2012/main" xmlns:mc="http://schemas.openxmlformats.org/markup-compatibility/2006" type="objOverTx" preserve="1">
+  <p:cSld name="Title, Content over Content">
+    <p:spTree>
+      <p:nvGrpSpPr>
+        <p:cNvPr id="1" name=""/>
+        <p:cNvGrpSpPr/>
+        <p:nvPr/>
+      </p:nvGrpSpPr>
+      <p:grpSpPr>
+        <a:xfrm>
+          <a:off x="0" y="0"/>
+          <a:ext cx="0" cy="0"/>
+          <a:chOff x="0" y="0"/>
+          <a:chExt cx="0" cy="0"/>
+        </a:xfrm>
+      </p:grpSpPr>
+      <p:sp>
+        <p:nvSpPr>
+          <p:cNvPr id="106" name="PlaceHolder 1"/>
+          <p:cNvSpPr>
+            <a:spLocks noGrp="1"/>
+          </p:cNvSpPr>
+          <p:nvPr>
+            <p:ph type="title"/>
+          </p:nvPr>
+        </p:nvSpPr>
+        <p:spPr>
+          <a:xfrm>
+            <a:off x="504000" y="226080"/>
+            <a:ext cx="9072000" cy="946440"/>
+          </a:xfrm>
+          <a:prstGeom prst="rect">
+            <a:avLst/>
+          </a:prstGeom>
+        </p:spPr>
+        <p:txBody>
+          <a:bodyPr lIns="0" rIns="0" tIns="0" bIns="0" anchor="ctr"/>
+          <a:p>
+            <a:pPr algn="ctr"/>
+            <a:endParaRPr b="0" lang="nl-NL" sz="4400" spc="-1" strike="noStrike">
+              <a:latin typeface="Arial"/>
+            </a:endParaRPr>
+          </a:p>
+        </p:txBody>
+      </p:sp>
+      <p:sp>
+        <p:nvSpPr>
+          <p:cNvPr id="107" name="PlaceHolder 2"/>
+          <p:cNvSpPr>
+            <a:spLocks noGrp="1"/>
+          </p:cNvSpPr>
+          <p:nvPr>
+            <p:ph type="body"/>
+          </p:nvPr>
+        </p:nvSpPr>
+        <p:spPr>
+          <a:xfrm>
+            <a:off x="504000" y="1326600"/>
+            <a:ext cx="9072000" cy="1568520"/>
+          </a:xfrm>
+          <a:prstGeom prst="rect">
+            <a:avLst/>
+          </a:prstGeom>
+        </p:spPr>
+        <p:txBody>
+          <a:bodyPr lIns="0" rIns="0" tIns="0" bIns="0">
+            <a:normAutofit/>
+          </a:bodyPr>
+          <a:p>
+            <a:endParaRPr b="0" lang="nl-NL" sz="3200" spc="-1" strike="noStrike">
+              <a:latin typeface="Arial"/>
+            </a:endParaRPr>
+          </a:p>
+        </p:txBody>
+      </p:sp>
+      <p:sp>
+        <p:nvSpPr>
+          <p:cNvPr id="108" name="PlaceHolder 3"/>
+          <p:cNvSpPr>
+            <a:spLocks noGrp="1"/>
+          </p:cNvSpPr>
+          <p:nvPr>
+            <p:ph type="body"/>
+          </p:nvPr>
+        </p:nvSpPr>
+        <p:spPr>
+          <a:xfrm>
+            <a:off x="504000" y="3044520"/>
+            <a:ext cx="9072000" cy="1568520"/>
+          </a:xfrm>
+          <a:prstGeom prst="rect">
+            <a:avLst/>
+          </a:prstGeom>
+        </p:spPr>
+        <p:txBody>
+          <a:bodyPr lIns="0" rIns="0" tIns="0" bIns="0">
+            <a:normAutofit/>
+          </a:bodyPr>
+          <a:p>
+            <a:endParaRPr b="0" lang="nl-NL" sz="3200" spc="-1" strike="noStrike">
+              <a:latin typeface="Arial"/>
+            </a:endParaRPr>
+          </a:p>
+        </p:txBody>
+      </p:sp>
+    </p:spTree>
+  </p:cSld>
+</p:sldLayout>
+</file>
+
+<file path=ppt/slideLayouts/slideLayout35.xml><?xml version="1.0" encoding="utf-8"?>
+<p:sldLayout xmlns:a="http://schemas.openxmlformats.org/drawingml/2006/main" xmlns:p="http://schemas.openxmlformats.org/presentationml/2006/main" xmlns:r="http://schemas.openxmlformats.org/officeDocument/2006/relationships" xmlns:p14="http://schemas.microsoft.com/office/powerpoint/2010/main" xmlns:p15="http://schemas.microsoft.com/office/powerpoint/2012/main" xmlns:mc="http://schemas.openxmlformats.org/markup-compatibility/2006" type="fourObj" preserve="1">
+  <p:cSld name="Title, 4 Content">
+    <p:spTree>
+      <p:nvGrpSpPr>
+        <p:cNvPr id="1" name=""/>
+        <p:cNvGrpSpPr/>
+        <p:nvPr/>
+      </p:nvGrpSpPr>
+      <p:grpSpPr>
+        <a:xfrm>
+          <a:off x="0" y="0"/>
+          <a:ext cx="0" cy="0"/>
+          <a:chOff x="0" y="0"/>
+          <a:chExt cx="0" cy="0"/>
+        </a:xfrm>
+      </p:grpSpPr>
+      <p:sp>
+        <p:nvSpPr>
+          <p:cNvPr id="109" name="PlaceHolder 1"/>
+          <p:cNvSpPr>
+            <a:spLocks noGrp="1"/>
+          </p:cNvSpPr>
+          <p:nvPr>
+            <p:ph type="title"/>
+          </p:nvPr>
+        </p:nvSpPr>
+        <p:spPr>
+          <a:xfrm>
+            <a:off x="504000" y="226080"/>
+            <a:ext cx="9072000" cy="946440"/>
+          </a:xfrm>
+          <a:prstGeom prst="rect">
+            <a:avLst/>
+          </a:prstGeom>
+        </p:spPr>
+        <p:txBody>
+          <a:bodyPr lIns="0" rIns="0" tIns="0" bIns="0" anchor="ctr"/>
+          <a:p>
+            <a:pPr algn="ctr"/>
+            <a:endParaRPr b="0" lang="nl-NL" sz="4400" spc="-1" strike="noStrike">
+              <a:latin typeface="Arial"/>
+            </a:endParaRPr>
+          </a:p>
+        </p:txBody>
+      </p:sp>
+      <p:sp>
+        <p:nvSpPr>
+          <p:cNvPr id="110" name="PlaceHolder 2"/>
+          <p:cNvSpPr>
+            <a:spLocks noGrp="1"/>
+          </p:cNvSpPr>
+          <p:nvPr>
+            <p:ph type="body"/>
+          </p:nvPr>
+        </p:nvSpPr>
+        <p:spPr>
+          <a:xfrm>
+            <a:off x="504000" y="1326600"/>
+            <a:ext cx="4426920" cy="1568520"/>
+          </a:xfrm>
+          <a:prstGeom prst="rect">
+            <a:avLst/>
+          </a:prstGeom>
+        </p:spPr>
+        <p:txBody>
+          <a:bodyPr lIns="0" rIns="0" tIns="0" bIns="0">
+            <a:normAutofit/>
+          </a:bodyPr>
+          <a:p>
+            <a:endParaRPr b="0" lang="nl-NL" sz="3200" spc="-1" strike="noStrike">
+              <a:latin typeface="Arial"/>
+            </a:endParaRPr>
+          </a:p>
+        </p:txBody>
+      </p:sp>
+      <p:sp>
+        <p:nvSpPr>
+          <p:cNvPr id="111" name="PlaceHolder 3"/>
+          <p:cNvSpPr>
+            <a:spLocks noGrp="1"/>
+          </p:cNvSpPr>
+          <p:nvPr>
+            <p:ph type="body"/>
+          </p:nvPr>
+        </p:nvSpPr>
+        <p:spPr>
+          <a:xfrm>
+            <a:off x="5152680" y="1326600"/>
+            <a:ext cx="4426920" cy="1568520"/>
+          </a:xfrm>
+          <a:prstGeom prst="rect">
+            <a:avLst/>
+          </a:prstGeom>
+        </p:spPr>
+        <p:txBody>
+          <a:bodyPr lIns="0" rIns="0" tIns="0" bIns="0">
+            <a:normAutofit/>
+          </a:bodyPr>
+          <a:p>
+            <a:endParaRPr b="0" lang="nl-NL" sz="3200" spc="-1" strike="noStrike">
+              <a:latin typeface="Arial"/>
+            </a:endParaRPr>
+          </a:p>
+        </p:txBody>
+      </p:sp>
+      <p:sp>
+        <p:nvSpPr>
+          <p:cNvPr id="112" name="PlaceHolder 4"/>
+          <p:cNvSpPr>
+            <a:spLocks noGrp="1"/>
+          </p:cNvSpPr>
+          <p:nvPr>
+            <p:ph type="body"/>
+          </p:nvPr>
+        </p:nvSpPr>
+        <p:spPr>
+          <a:xfrm>
+            <a:off x="5152680" y="3044520"/>
+            <a:ext cx="4426920" cy="1568520"/>
+          </a:xfrm>
+          <a:prstGeom prst="rect">
+            <a:avLst/>
+          </a:prstGeom>
+        </p:spPr>
+        <p:txBody>
+          <a:bodyPr lIns="0" rIns="0" tIns="0" bIns="0">
+            <a:normAutofit/>
+          </a:bodyPr>
+          <a:p>
+            <a:endParaRPr b="0" lang="nl-NL" sz="3200" spc="-1" strike="noStrike">
+              <a:latin typeface="Arial"/>
+            </a:endParaRPr>
+          </a:p>
+        </p:txBody>
+      </p:sp>
+      <p:sp>
+        <p:nvSpPr>
+          <p:cNvPr id="113" name="PlaceHolder 5"/>
+          <p:cNvSpPr>
+            <a:spLocks noGrp="1"/>
+          </p:cNvSpPr>
+          <p:nvPr>
+            <p:ph type="body"/>
+          </p:nvPr>
+        </p:nvSpPr>
+        <p:spPr>
+          <a:xfrm>
+            <a:off x="504000" y="3044520"/>
+            <a:ext cx="4426920" cy="1568520"/>
+          </a:xfrm>
+          <a:prstGeom prst="rect">
+            <a:avLst/>
+          </a:prstGeom>
+        </p:spPr>
+        <p:txBody>
+          <a:bodyPr lIns="0" rIns="0" tIns="0" bIns="0">
+            <a:normAutofit/>
+          </a:bodyPr>
+          <a:p>
+            <a:endParaRPr b="0" lang="nl-NL" sz="3200" spc="-1" strike="noStrike">
+              <a:latin typeface="Arial"/>
+            </a:endParaRPr>
+          </a:p>
+        </p:txBody>
+      </p:sp>
+    </p:spTree>
+  </p:cSld>
+</p:sldLayout>
+</file>
+
+<file path=ppt/slideLayouts/slideLayout36.xml><?xml version="1.0" encoding="utf-8"?>
+<p:sldLayout xmlns:a="http://schemas.openxmlformats.org/drawingml/2006/main" xmlns:p="http://schemas.openxmlformats.org/presentationml/2006/main" xmlns:r="http://schemas.openxmlformats.org/officeDocument/2006/relationships" xmlns:p14="http://schemas.microsoft.com/office/powerpoint/2010/main" xmlns:p15="http://schemas.microsoft.com/office/powerpoint/2012/main" xmlns:mc="http://schemas.openxmlformats.org/markup-compatibility/2006" type="blank" preserve="1">
+  <p:cSld name="Title, 6 Content">
+    <p:spTree>
+      <p:nvGrpSpPr>
+        <p:cNvPr id="1" name=""/>
+        <p:cNvGrpSpPr/>
+        <p:nvPr/>
+      </p:nvGrpSpPr>
+      <p:grpSpPr>
+        <a:xfrm>
+          <a:off x="0" y="0"/>
+          <a:ext cx="0" cy="0"/>
+          <a:chOff x="0" y="0"/>
+          <a:chExt cx="0" cy="0"/>
+        </a:xfrm>
+      </p:grpSpPr>
+      <p:sp>
+        <p:nvSpPr>
+          <p:cNvPr id="114" name="PlaceHolder 1"/>
+          <p:cNvSpPr>
+            <a:spLocks noGrp="1"/>
+          </p:cNvSpPr>
+          <p:nvPr>
+            <p:ph type="title"/>
+          </p:nvPr>
+        </p:nvSpPr>
+        <p:spPr>
+          <a:xfrm>
+            <a:off x="504000" y="226080"/>
+            <a:ext cx="9072000" cy="946440"/>
+          </a:xfrm>
+          <a:prstGeom prst="rect">
+            <a:avLst/>
+          </a:prstGeom>
+        </p:spPr>
+        <p:txBody>
+          <a:bodyPr lIns="0" rIns="0" tIns="0" bIns="0" anchor="ctr"/>
+          <a:p>
+            <a:pPr algn="ctr"/>
+            <a:endParaRPr b="0" lang="nl-NL" sz="4400" spc="-1" strike="noStrike">
+              <a:latin typeface="Arial"/>
+            </a:endParaRPr>
+          </a:p>
+        </p:txBody>
+      </p:sp>
+      <p:sp>
+        <p:nvSpPr>
+          <p:cNvPr id="115" name="PlaceHolder 2"/>
+          <p:cNvSpPr>
+            <a:spLocks noGrp="1"/>
+          </p:cNvSpPr>
+          <p:nvPr>
+            <p:ph type="body"/>
+          </p:nvPr>
+        </p:nvSpPr>
+        <p:spPr>
+          <a:xfrm>
+            <a:off x="504000" y="1326600"/>
+            <a:ext cx="2921040" cy="1568520"/>
+          </a:xfrm>
+          <a:prstGeom prst="rect">
+            <a:avLst/>
+          </a:prstGeom>
+        </p:spPr>
+        <p:txBody>
+          <a:bodyPr lIns="0" rIns="0" tIns="0" bIns="0">
+            <a:normAutofit/>
+          </a:bodyPr>
+          <a:p>
+            <a:endParaRPr b="0" lang="nl-NL" sz="3200" spc="-1" strike="noStrike">
+              <a:latin typeface="Arial"/>
+            </a:endParaRPr>
+          </a:p>
+        </p:txBody>
+      </p:sp>
+      <p:sp>
+        <p:nvSpPr>
+          <p:cNvPr id="116" name="PlaceHolder 3"/>
+          <p:cNvSpPr>
+            <a:spLocks noGrp="1"/>
+          </p:cNvSpPr>
+          <p:nvPr>
+            <p:ph type="body"/>
+          </p:nvPr>
+        </p:nvSpPr>
+        <p:spPr>
+          <a:xfrm>
+            <a:off x="3571560" y="1326600"/>
+            <a:ext cx="2921040" cy="1568520"/>
+          </a:xfrm>
+          <a:prstGeom prst="rect">
+            <a:avLst/>
+          </a:prstGeom>
+        </p:spPr>
+        <p:txBody>
+          <a:bodyPr lIns="0" rIns="0" tIns="0" bIns="0">
+            <a:normAutofit/>
+          </a:bodyPr>
+          <a:p>
+            <a:endParaRPr b="0" lang="nl-NL" sz="3200" spc="-1" strike="noStrike">
+              <a:latin typeface="Arial"/>
+            </a:endParaRPr>
+          </a:p>
+        </p:txBody>
+      </p:sp>
+      <p:sp>
+        <p:nvSpPr>
+          <p:cNvPr id="117" name="PlaceHolder 4"/>
+          <p:cNvSpPr>
+            <a:spLocks noGrp="1"/>
+          </p:cNvSpPr>
+          <p:nvPr>
+            <p:ph type="body"/>
+          </p:nvPr>
+        </p:nvSpPr>
+        <p:spPr>
+          <a:xfrm>
+            <a:off x="6639120" y="1326600"/>
+            <a:ext cx="2921040" cy="1568520"/>
+          </a:xfrm>
+          <a:prstGeom prst="rect">
+            <a:avLst/>
+          </a:prstGeom>
+        </p:spPr>
+        <p:txBody>
+          <a:bodyPr lIns="0" rIns="0" tIns="0" bIns="0">
+            <a:normAutofit/>
+          </a:bodyPr>
+          <a:p>
+            <a:endParaRPr b="0" lang="nl-NL" sz="3200" spc="-1" strike="noStrike">
+              <a:latin typeface="Arial"/>
+            </a:endParaRPr>
+          </a:p>
+        </p:txBody>
+      </p:sp>
+      <p:sp>
+        <p:nvSpPr>
+          <p:cNvPr id="118" name="PlaceHolder 5"/>
+          <p:cNvSpPr>
+            <a:spLocks noGrp="1"/>
+          </p:cNvSpPr>
+          <p:nvPr>
+            <p:ph type="body"/>
+          </p:nvPr>
+        </p:nvSpPr>
+        <p:spPr>
+          <a:xfrm>
+            <a:off x="6639120" y="3044520"/>
+            <a:ext cx="2921040" cy="1568520"/>
+          </a:xfrm>
+          <a:prstGeom prst="rect">
+            <a:avLst/>
+          </a:prstGeom>
+        </p:spPr>
+        <p:txBody>
+          <a:bodyPr lIns="0" rIns="0" tIns="0" bIns="0">
+            <a:normAutofit/>
+          </a:bodyPr>
+          <a:p>
+            <a:endParaRPr b="0" lang="nl-NL" sz="3200" spc="-1" strike="noStrike">
+              <a:latin typeface="Arial"/>
+            </a:endParaRPr>
+          </a:p>
+        </p:txBody>
+      </p:sp>
+      <p:sp>
+        <p:nvSpPr>
+          <p:cNvPr id="119" name="PlaceHolder 6"/>
+          <p:cNvSpPr>
+            <a:spLocks noGrp="1"/>
+          </p:cNvSpPr>
+          <p:nvPr>
+            <p:ph type="body"/>
+          </p:nvPr>
+        </p:nvSpPr>
+        <p:spPr>
+          <a:xfrm>
+            <a:off x="3571560" y="3044520"/>
+            <a:ext cx="2921040" cy="1568520"/>
+          </a:xfrm>
+          <a:prstGeom prst="rect">
+            <a:avLst/>
+          </a:prstGeom>
+        </p:spPr>
+        <p:txBody>
+          <a:bodyPr lIns="0" rIns="0" tIns="0" bIns="0">
+            <a:normAutofit/>
+          </a:bodyPr>
+          <a:p>
+            <a:endParaRPr b="0" lang="nl-NL" sz="3200" spc="-1" strike="noStrike">
+              <a:latin typeface="Arial"/>
+            </a:endParaRPr>
+          </a:p>
+        </p:txBody>
+      </p:sp>
+      <p:sp>
+        <p:nvSpPr>
+          <p:cNvPr id="120" name="PlaceHolder 7"/>
+          <p:cNvSpPr>
+            <a:spLocks noGrp="1"/>
+          </p:cNvSpPr>
+          <p:nvPr>
+            <p:ph type="body"/>
+          </p:nvPr>
+        </p:nvSpPr>
+        <p:spPr>
+          <a:xfrm>
+            <a:off x="504000" y="3044520"/>
+            <a:ext cx="2921040" cy="1568520"/>
           </a:xfrm>
           <a:prstGeom prst="rect">
             <a:avLst/>
@@ -2717,7 +4051,7 @@
         <p:spPr>
           <a:xfrm>
             <a:off x="0" y="360"/>
-            <a:ext cx="10079280" cy="5039280"/>
+            <a:ext cx="10078200" cy="5038200"/>
           </a:xfrm>
           <a:prstGeom prst="rect">
             <a:avLst/>
@@ -2748,23 +4082,24 @@
         </p:nvSpPr>
         <p:spPr>
           <a:xfrm>
-            <a:off x="360000" y="301320"/>
-            <a:ext cx="9359280" cy="957960"/>
-          </a:xfrm>
-          <a:prstGeom prst="rect">
-            <a:avLst/>
-          </a:prstGeom>
-        </p:spPr>
-        <p:txBody>
-          <a:bodyPr lIns="0" rIns="0" tIns="0" bIns="0" anchor="ctr" anchorCtr="1"/>
-          <a:p>
+            <a:off x="504000" y="226080"/>
+            <a:ext cx="9072000" cy="946440"/>
+          </a:xfrm>
+          <a:prstGeom prst="rect">
+            <a:avLst/>
+          </a:prstGeom>
+        </p:spPr>
+        <p:txBody>
+          <a:bodyPr lIns="0" rIns="0" tIns="0" bIns="0" anchor="ctr"/>
+          <a:p>
+            <a:pPr algn="ctr"/>
             <a:r>
-              <a:rPr b="0" lang="nl-NL" sz="1800" spc="-1" strike="noStrike">
+              <a:rPr b="0" lang="nl-NL" sz="4400" spc="-1" strike="noStrike">
                 <a:latin typeface="Arial"/>
               </a:rPr>
               <a:t>Click to edit the title text format</a:t>
             </a:r>
-            <a:endParaRPr b="0" lang="nl-NL" sz="1800" spc="-1" strike="noStrike">
+            <a:endParaRPr b="0" lang="nl-NL" sz="4400" spc="-1" strike="noStrike">
               <a:latin typeface="Arial"/>
             </a:endParaRPr>
           </a:p>
@@ -2782,8 +4117,8 @@
         </p:nvSpPr>
         <p:spPr>
           <a:xfrm>
-            <a:off x="360000" y="1979640"/>
-            <a:ext cx="9359280" cy="5039280"/>
+            <a:off x="504000" y="1326600"/>
+            <a:ext cx="9072000" cy="3288600"/>
           </a:xfrm>
           <a:prstGeom prst="rect">
             <a:avLst/>
@@ -2806,12 +4141,12 @@
               <a:buChar char=""/>
             </a:pPr>
             <a:r>
-              <a:rPr b="0" lang="nl-NL" sz="1800" spc="-1" strike="noStrike">
+              <a:rPr b="0" lang="nl-NL" sz="3200" spc="-1" strike="noStrike">
                 <a:latin typeface="Arial"/>
               </a:rPr>
               <a:t>Click to edit the outline text format</a:t>
             </a:r>
-            <a:endParaRPr b="0" lang="nl-NL" sz="1800" spc="-1" strike="noStrike">
+            <a:endParaRPr b="0" lang="nl-NL" sz="3200" spc="-1" strike="noStrike">
               <a:latin typeface="Arial"/>
             </a:endParaRPr>
           </a:p>
@@ -2828,12 +4163,12 @@
               <a:buChar char=""/>
             </a:pPr>
             <a:r>
-              <a:rPr b="0" lang="nl-NL" sz="1800" spc="-1" strike="noStrike">
+              <a:rPr b="0" lang="nl-NL" sz="2800" spc="-1" strike="noStrike">
                 <a:latin typeface="Arial"/>
               </a:rPr>
               <a:t>Second Outline Level</a:t>
             </a:r>
-            <a:endParaRPr b="0" lang="nl-NL" sz="1800" spc="-1" strike="noStrike">
+            <a:endParaRPr b="0" lang="nl-NL" sz="2800" spc="-1" strike="noStrike">
               <a:latin typeface="Arial"/>
             </a:endParaRPr>
           </a:p>
@@ -2850,12 +4185,12 @@
               <a:buChar char=""/>
             </a:pPr>
             <a:r>
-              <a:rPr b="0" lang="nl-NL" sz="1800" spc="-1" strike="noStrike">
+              <a:rPr b="0" lang="nl-NL" sz="2400" spc="-1" strike="noStrike">
                 <a:latin typeface="Arial"/>
               </a:rPr>
               <a:t>Third Outline Level</a:t>
             </a:r>
-            <a:endParaRPr b="0" lang="nl-NL" sz="1800" spc="-1" strike="noStrike">
+            <a:endParaRPr b="0" lang="nl-NL" sz="2400" spc="-1" strike="noStrike">
               <a:latin typeface="Arial"/>
             </a:endParaRPr>
           </a:p>
@@ -2872,12 +4207,12 @@
               <a:buChar char=""/>
             </a:pPr>
             <a:r>
-              <a:rPr b="0" lang="nl-NL" sz="1800" spc="-1" strike="noStrike">
+              <a:rPr b="0" lang="nl-NL" sz="2000" spc="-1" strike="noStrike">
                 <a:latin typeface="Arial"/>
               </a:rPr>
               <a:t>Fourth Outline Level</a:t>
             </a:r>
-            <a:endParaRPr b="0" lang="nl-NL" sz="1800" spc="-1" strike="noStrike">
+            <a:endParaRPr b="0" lang="nl-NL" sz="2000" spc="-1" strike="noStrike">
               <a:latin typeface="Arial"/>
             </a:endParaRPr>
           </a:p>
@@ -2894,12 +4229,12 @@
               <a:buChar char=""/>
             </a:pPr>
             <a:r>
-              <a:rPr b="0" lang="nl-NL" sz="1800" spc="-1" strike="noStrike">
+              <a:rPr b="0" lang="nl-NL" sz="2000" spc="-1" strike="noStrike">
                 <a:latin typeface="Arial"/>
               </a:rPr>
               <a:t>Fifth Outline Level</a:t>
             </a:r>
-            <a:endParaRPr b="0" lang="nl-NL" sz="1800" spc="-1" strike="noStrike">
+            <a:endParaRPr b="0" lang="nl-NL" sz="2000" spc="-1" strike="noStrike">
               <a:latin typeface="Arial"/>
             </a:endParaRPr>
           </a:p>
@@ -2916,12 +4251,12 @@
               <a:buChar char=""/>
             </a:pPr>
             <a:r>
-              <a:rPr b="0" lang="nl-NL" sz="1800" spc="-1" strike="noStrike">
+              <a:rPr b="0" lang="nl-NL" sz="2000" spc="-1" strike="noStrike">
                 <a:latin typeface="Arial"/>
               </a:rPr>
               <a:t>Sixth Outline Level</a:t>
             </a:r>
-            <a:endParaRPr b="0" lang="nl-NL" sz="1800" spc="-1" strike="noStrike">
+            <a:endParaRPr b="0" lang="nl-NL" sz="2000" spc="-1" strike="noStrike">
               <a:latin typeface="Arial"/>
             </a:endParaRPr>
           </a:p>
@@ -2938,12 +4273,12 @@
               <a:buChar char=""/>
             </a:pPr>
             <a:r>
-              <a:rPr b="0" lang="nl-NL" sz="1800" spc="-1" strike="noStrike">
+              <a:rPr b="0" lang="nl-NL" sz="2000" spc="-1" strike="noStrike">
                 <a:latin typeface="Arial"/>
               </a:rPr>
               <a:t>Seventh Outline Level</a:t>
             </a:r>
-            <a:endParaRPr b="0" lang="nl-NL" sz="1800" spc="-1" strike="noStrike">
+            <a:endParaRPr b="0" lang="nl-NL" sz="2000" spc="-1" strike="noStrike">
               <a:latin typeface="Arial"/>
             </a:endParaRPr>
           </a:p>
@@ -2995,7 +4330,7 @@
         <p:spPr>
           <a:xfrm>
             <a:off x="0" y="7199640"/>
-            <a:ext cx="10079280" cy="359280"/>
+            <a:ext cx="10078200" cy="358200"/>
           </a:xfrm>
           <a:prstGeom prst="rect">
             <a:avLst/>
@@ -3023,7 +4358,7 @@
         <p:spPr>
           <a:xfrm>
             <a:off x="0" y="0"/>
-            <a:ext cx="10079280" cy="1619280"/>
+            <a:ext cx="10078200" cy="1618200"/>
           </a:xfrm>
           <a:prstGeom prst="rect">
             <a:avLst/>
@@ -3051,7 +4386,7 @@
         <p:spPr>
           <a:xfrm>
             <a:off x="9270000" y="6894000"/>
-            <a:ext cx="539280" cy="539280"/>
+            <a:ext cx="538200" cy="538200"/>
           </a:xfrm>
           <a:prstGeom prst="ellipse">
             <a:avLst/>
@@ -3300,6 +4635,341 @@
     <p:sldLayoutId id="2147483671" r:id="rId11"/>
     <p:sldLayoutId id="2147483672" r:id="rId12"/>
     <p:sldLayoutId id="2147483673" r:id="rId13"/>
+  </p:sldLayoutIdLst>
+</p:sldMaster>
+</file>
+
+<file path=ppt/slideMasters/slideMaster3.xml><?xml version="1.0" encoding="utf-8"?>
+<p:sldMaster xmlns:a="http://schemas.openxmlformats.org/drawingml/2006/main" xmlns:p="http://schemas.openxmlformats.org/presentationml/2006/main" xmlns:r="http://schemas.openxmlformats.org/officeDocument/2006/relationships" xmlns:p14="http://schemas.microsoft.com/office/powerpoint/2010/main" xmlns:p15="http://schemas.microsoft.com/office/powerpoint/2012/main" xmlns:mc="http://schemas.openxmlformats.org/markup-compatibility/2006">
+  <p:cSld>
+    <p:spTree>
+      <p:nvGrpSpPr>
+        <p:cNvPr id="1" name=""/>
+        <p:cNvGrpSpPr/>
+        <p:nvPr/>
+      </p:nvGrpSpPr>
+      <p:grpSpPr>
+        <a:xfrm>
+          <a:off x="0" y="0"/>
+          <a:ext cx="0" cy="0"/>
+          <a:chOff x="0" y="0"/>
+          <a:chExt cx="0" cy="0"/>
+        </a:xfrm>
+      </p:grpSpPr>
+      <p:sp>
+        <p:nvSpPr>
+          <p:cNvPr id="80" name="CustomShape 1"/>
+          <p:cNvSpPr/>
+          <p:nvPr/>
+        </p:nvSpPr>
+        <p:spPr>
+          <a:xfrm>
+            <a:off x="0" y="7199640"/>
+            <a:ext cx="10078200" cy="358200"/>
+          </a:xfrm>
+          <a:prstGeom prst="rect">
+            <a:avLst/>
+          </a:prstGeom>
+          <a:solidFill>
+            <a:srgbClr val="2c3e50"/>
+          </a:solidFill>
+          <a:ln w="72000">
+            <a:noFill/>
+          </a:ln>
+        </p:spPr>
+        <p:style>
+          <a:lnRef idx="0"/>
+          <a:fillRef idx="0"/>
+          <a:effectRef idx="0"/>
+          <a:fontRef idx="minor"/>
+        </p:style>
+      </p:sp>
+      <p:sp>
+        <p:nvSpPr>
+          <p:cNvPr id="81" name="CustomShape 2"/>
+          <p:cNvSpPr/>
+          <p:nvPr/>
+        </p:nvSpPr>
+        <p:spPr>
+          <a:xfrm>
+            <a:off x="0" y="0"/>
+            <a:ext cx="10078200" cy="1618200"/>
+          </a:xfrm>
+          <a:prstGeom prst="rect">
+            <a:avLst/>
+          </a:prstGeom>
+          <a:solidFill>
+            <a:srgbClr val="2c3e50"/>
+          </a:solidFill>
+          <a:ln w="72000">
+            <a:noFill/>
+          </a:ln>
+        </p:spPr>
+        <p:style>
+          <a:lnRef idx="0"/>
+          <a:fillRef idx="0"/>
+          <a:effectRef idx="0"/>
+          <a:fontRef idx="minor"/>
+        </p:style>
+      </p:sp>
+      <p:sp>
+        <p:nvSpPr>
+          <p:cNvPr id="82" name="CustomShape 3"/>
+          <p:cNvSpPr/>
+          <p:nvPr/>
+        </p:nvSpPr>
+        <p:spPr>
+          <a:xfrm>
+            <a:off x="9270000" y="6894000"/>
+            <a:ext cx="538200" cy="538200"/>
+          </a:xfrm>
+          <a:prstGeom prst="ellipse">
+            <a:avLst/>
+          </a:prstGeom>
+          <a:solidFill>
+            <a:srgbClr val="1abc9c"/>
+          </a:solidFill>
+          <a:ln w="72000">
+            <a:noFill/>
+          </a:ln>
+        </p:spPr>
+        <p:style>
+          <a:lnRef idx="0"/>
+          <a:fillRef idx="0"/>
+          <a:effectRef idx="0"/>
+          <a:fontRef idx="minor"/>
+        </p:style>
+      </p:sp>
+      <p:sp>
+        <p:nvSpPr>
+          <p:cNvPr id="83" name="PlaceHolder 4"/>
+          <p:cNvSpPr>
+            <a:spLocks noGrp="1"/>
+          </p:cNvSpPr>
+          <p:nvPr>
+            <p:ph type="title"/>
+          </p:nvPr>
+        </p:nvSpPr>
+        <p:spPr>
+          <a:xfrm>
+            <a:off x="504000" y="226080"/>
+            <a:ext cx="9072000" cy="946440"/>
+          </a:xfrm>
+          <a:prstGeom prst="rect">
+            <a:avLst/>
+          </a:prstGeom>
+        </p:spPr>
+        <p:txBody>
+          <a:bodyPr lIns="0" rIns="0" tIns="0" bIns="0" anchor="ctr"/>
+          <a:p>
+            <a:pPr algn="ctr"/>
+            <a:r>
+              <a:rPr b="0" lang="nl-NL" sz="4400" spc="-1" strike="noStrike">
+                <a:latin typeface="Arial"/>
+              </a:rPr>
+              <a:t>Click to edit the title text format</a:t>
+            </a:r>
+            <a:endParaRPr b="0" lang="nl-NL" sz="4400" spc="-1" strike="noStrike">
+              <a:latin typeface="Arial"/>
+            </a:endParaRPr>
+          </a:p>
+        </p:txBody>
+      </p:sp>
+      <p:sp>
+        <p:nvSpPr>
+          <p:cNvPr id="84" name="PlaceHolder 5"/>
+          <p:cNvSpPr>
+            <a:spLocks noGrp="1"/>
+          </p:cNvSpPr>
+          <p:nvPr>
+            <p:ph type="body"/>
+          </p:nvPr>
+        </p:nvSpPr>
+        <p:spPr>
+          <a:xfrm>
+            <a:off x="504000" y="1326600"/>
+            <a:ext cx="9072000" cy="3288600"/>
+          </a:xfrm>
+          <a:prstGeom prst="rect">
+            <a:avLst/>
+          </a:prstGeom>
+        </p:spPr>
+        <p:txBody>
+          <a:bodyPr lIns="0" rIns="0" tIns="0" bIns="0">
+            <a:normAutofit/>
+          </a:bodyPr>
+          <a:p>
+            <a:pPr marL="432000" indent="-324000">
+              <a:spcBef>
+                <a:spcPts val="1417"/>
+              </a:spcBef>
+              <a:buClr>
+                <a:srgbClr val="000000"/>
+              </a:buClr>
+              <a:buSzPct val="45000"/>
+              <a:buFont typeface="Wingdings" charset="2"/>
+              <a:buChar char=""/>
+            </a:pPr>
+            <a:r>
+              <a:rPr b="0" lang="nl-NL" sz="3200" spc="-1" strike="noStrike">
+                <a:latin typeface="Arial"/>
+              </a:rPr>
+              <a:t>Click to edit the outline text format</a:t>
+            </a:r>
+            <a:endParaRPr b="0" lang="nl-NL" sz="3200" spc="-1" strike="noStrike">
+              <a:latin typeface="Arial"/>
+            </a:endParaRPr>
+          </a:p>
+          <a:p>
+            <a:pPr lvl="1" marL="864000" indent="-324000">
+              <a:spcBef>
+                <a:spcPts val="1134"/>
+              </a:spcBef>
+              <a:buClr>
+                <a:srgbClr val="000000"/>
+              </a:buClr>
+              <a:buSzPct val="75000"/>
+              <a:buFont typeface="Symbol" charset="2"/>
+              <a:buChar char=""/>
+            </a:pPr>
+            <a:r>
+              <a:rPr b="0" lang="nl-NL" sz="2800" spc="-1" strike="noStrike">
+                <a:latin typeface="Arial"/>
+              </a:rPr>
+              <a:t>Second Outline Level</a:t>
+            </a:r>
+            <a:endParaRPr b="0" lang="nl-NL" sz="2800" spc="-1" strike="noStrike">
+              <a:latin typeface="Arial"/>
+            </a:endParaRPr>
+          </a:p>
+          <a:p>
+            <a:pPr lvl="2" marL="1296000" indent="-288000">
+              <a:spcBef>
+                <a:spcPts val="850"/>
+              </a:spcBef>
+              <a:buClr>
+                <a:srgbClr val="000000"/>
+              </a:buClr>
+              <a:buSzPct val="45000"/>
+              <a:buFont typeface="Wingdings" charset="2"/>
+              <a:buChar char=""/>
+            </a:pPr>
+            <a:r>
+              <a:rPr b="0" lang="nl-NL" sz="2400" spc="-1" strike="noStrike">
+                <a:latin typeface="Arial"/>
+              </a:rPr>
+              <a:t>Third Outline Level</a:t>
+            </a:r>
+            <a:endParaRPr b="0" lang="nl-NL" sz="2400" spc="-1" strike="noStrike">
+              <a:latin typeface="Arial"/>
+            </a:endParaRPr>
+          </a:p>
+          <a:p>
+            <a:pPr lvl="3" marL="1728000" indent="-216000">
+              <a:spcBef>
+                <a:spcPts val="567"/>
+              </a:spcBef>
+              <a:buClr>
+                <a:srgbClr val="000000"/>
+              </a:buClr>
+              <a:buSzPct val="75000"/>
+              <a:buFont typeface="Symbol" charset="2"/>
+              <a:buChar char=""/>
+            </a:pPr>
+            <a:r>
+              <a:rPr b="0" lang="nl-NL" sz="2000" spc="-1" strike="noStrike">
+                <a:latin typeface="Arial"/>
+              </a:rPr>
+              <a:t>Fourth Outline Level</a:t>
+            </a:r>
+            <a:endParaRPr b="0" lang="nl-NL" sz="2000" spc="-1" strike="noStrike">
+              <a:latin typeface="Arial"/>
+            </a:endParaRPr>
+          </a:p>
+          <a:p>
+            <a:pPr lvl="4" marL="2160000" indent="-216000">
+              <a:spcBef>
+                <a:spcPts val="283"/>
+              </a:spcBef>
+              <a:buClr>
+                <a:srgbClr val="000000"/>
+              </a:buClr>
+              <a:buSzPct val="45000"/>
+              <a:buFont typeface="Wingdings" charset="2"/>
+              <a:buChar char=""/>
+            </a:pPr>
+            <a:r>
+              <a:rPr b="0" lang="nl-NL" sz="2000" spc="-1" strike="noStrike">
+                <a:latin typeface="Arial"/>
+              </a:rPr>
+              <a:t>Fifth Outline Level</a:t>
+            </a:r>
+            <a:endParaRPr b="0" lang="nl-NL" sz="2000" spc="-1" strike="noStrike">
+              <a:latin typeface="Arial"/>
+            </a:endParaRPr>
+          </a:p>
+          <a:p>
+            <a:pPr lvl="5" marL="2592000" indent="-216000">
+              <a:spcBef>
+                <a:spcPts val="283"/>
+              </a:spcBef>
+              <a:buClr>
+                <a:srgbClr val="000000"/>
+              </a:buClr>
+              <a:buSzPct val="45000"/>
+              <a:buFont typeface="Wingdings" charset="2"/>
+              <a:buChar char=""/>
+            </a:pPr>
+            <a:r>
+              <a:rPr b="0" lang="nl-NL" sz="2000" spc="-1" strike="noStrike">
+                <a:latin typeface="Arial"/>
+              </a:rPr>
+              <a:t>Sixth Outline Level</a:t>
+            </a:r>
+            <a:endParaRPr b="0" lang="nl-NL" sz="2000" spc="-1" strike="noStrike">
+              <a:latin typeface="Arial"/>
+            </a:endParaRPr>
+          </a:p>
+          <a:p>
+            <a:pPr lvl="6" marL="3024000" indent="-216000">
+              <a:spcBef>
+                <a:spcPts val="283"/>
+              </a:spcBef>
+              <a:buClr>
+                <a:srgbClr val="000000"/>
+              </a:buClr>
+              <a:buSzPct val="45000"/>
+              <a:buFont typeface="Wingdings" charset="2"/>
+              <a:buChar char=""/>
+            </a:pPr>
+            <a:r>
+              <a:rPr b="0" lang="nl-NL" sz="2000" spc="-1" strike="noStrike">
+                <a:latin typeface="Arial"/>
+              </a:rPr>
+              <a:t>Seventh Outline Level</a:t>
+            </a:r>
+            <a:endParaRPr b="0" lang="nl-NL" sz="2000" spc="-1" strike="noStrike">
+              <a:latin typeface="Arial"/>
+            </a:endParaRPr>
+          </a:p>
+        </p:txBody>
+      </p:sp>
+    </p:spTree>
+  </p:cSld>
+  <p:clrMap bg1="lt1" bg2="lt2" tx1="dk1" tx2="dk2" accent1="accent1" accent2="accent2" accent3="accent3" accent4="accent4" accent5="accent5" accent6="accent6" hlink="hlink" folHlink="folHlink"/>
+  <p:sldLayoutIdLst>
+    <p:sldLayoutId id="2147483675" r:id="rId2"/>
+    <p:sldLayoutId id="2147483676" r:id="rId3"/>
+    <p:sldLayoutId id="2147483677" r:id="rId4"/>
+    <p:sldLayoutId id="2147483678" r:id="rId5"/>
+    <p:sldLayoutId id="2147483679" r:id="rId6"/>
+    <p:sldLayoutId id="2147483680" r:id="rId7"/>
+    <p:sldLayoutId id="2147483681" r:id="rId8"/>
+    <p:sldLayoutId id="2147483682" r:id="rId9"/>
+    <p:sldLayoutId id="2147483683" r:id="rId10"/>
+    <p:sldLayoutId id="2147483684" r:id="rId11"/>
+    <p:sldLayoutId id="2147483685" r:id="rId12"/>
+    <p:sldLayoutId id="2147483686" r:id="rId13"/>
   </p:sldLayoutIdLst>
 </p:sldMaster>
 </file>
@@ -3323,14 +4993,14 @@
       </p:grpSpPr>
       <p:sp>
         <p:nvSpPr>
-          <p:cNvPr id="80" name="CustomShape 1"/>
+          <p:cNvPr id="121" name="CustomShape 1"/>
           <p:cNvSpPr/>
           <p:nvPr/>
         </p:nvSpPr>
         <p:spPr>
           <a:xfrm>
             <a:off x="360000" y="3780000"/>
-            <a:ext cx="9359280" cy="957960"/>
+            <a:ext cx="9358200" cy="956880"/>
           </a:xfrm>
           <a:prstGeom prst="rect">
             <a:avLst/>
@@ -3372,14 +5042,14 @@
       </p:sp>
       <p:sp>
         <p:nvSpPr>
-          <p:cNvPr id="81" name="CustomShape 2"/>
+          <p:cNvPr id="122" name="CustomShape 2"/>
           <p:cNvSpPr/>
           <p:nvPr/>
         </p:nvSpPr>
         <p:spPr>
           <a:xfrm>
             <a:off x="2088000" y="4968000"/>
-            <a:ext cx="6191280" cy="719280"/>
+            <a:ext cx="6190200" cy="718200"/>
           </a:xfrm>
           <a:prstGeom prst="rect">
             <a:avLst/>
@@ -3411,7 +5081,7 @@
                 <a:latin typeface="Source Sans Pro"/>
                 <a:ea typeface="DejaVu Sans"/>
               </a:rPr>
-              <a:t>Aman, Xander, Mark, Mitchel</a:t>
+              <a:t>Aman, Cherie, Mark, Xander, Mitchel.</a:t>
             </a:r>
             <a:endParaRPr b="0" lang="nl-NL" sz="2200" spc="-1" strike="noStrike">
               <a:latin typeface="Arial"/>
@@ -3421,7 +5091,7 @@
       </p:sp>
       <p:pic>
         <p:nvPicPr>
-          <p:cNvPr id="82" name="" descr=""/>
+          <p:cNvPr id="123" name="" descr=""/>
           <p:cNvPicPr/>
           <p:nvPr/>
         </p:nvPicPr>
@@ -3432,7 +5102,7 @@
         <p:spPr>
           <a:xfrm>
             <a:off x="2592000" y="720000"/>
-            <a:ext cx="4895280" cy="3050640"/>
+            <a:ext cx="4894200" cy="3049560"/>
           </a:xfrm>
           <a:prstGeom prst="rect">
             <a:avLst/>
@@ -3493,14 +5163,14 @@
       </p:grpSpPr>
       <p:sp>
         <p:nvSpPr>
-          <p:cNvPr id="83" name="CustomShape 1"/>
+          <p:cNvPr id="124" name="CustomShape 1"/>
           <p:cNvSpPr/>
           <p:nvPr/>
         </p:nvSpPr>
         <p:spPr>
           <a:xfrm>
             <a:off x="360000" y="301320"/>
-            <a:ext cx="8963280" cy="960480"/>
+            <a:ext cx="8962200" cy="959400"/>
           </a:xfrm>
           <a:prstGeom prst="rect">
             <a:avLst/>
@@ -3542,14 +5212,14 @@
       </p:sp>
       <p:sp>
         <p:nvSpPr>
-          <p:cNvPr id="84" name="CustomShape 2"/>
+          <p:cNvPr id="125" name="CustomShape 2"/>
           <p:cNvSpPr/>
           <p:nvPr/>
         </p:nvSpPr>
         <p:spPr>
           <a:xfrm>
             <a:off x="360000" y="1979640"/>
-            <a:ext cx="9431280" cy="3347640"/>
+            <a:ext cx="9430200" cy="3346560"/>
           </a:xfrm>
           <a:prstGeom prst="rect">
             <a:avLst/>
@@ -3570,7 +5240,7 @@
             <a:normAutofit/>
           </a:bodyPr>
           <a:p>
-            <a:pPr marL="432000" indent="-323280">
+            <a:pPr marL="432000" indent="-322200">
               <a:lnSpc>
                 <a:spcPct val="100000"/>
               </a:lnSpc>
@@ -3599,7 +5269,7 @@
             </a:endParaRPr>
           </a:p>
           <a:p>
-            <a:pPr marL="432000" indent="-323280">
+            <a:pPr marL="432000" indent="-322200">
               <a:lnSpc>
                 <a:spcPct val="100000"/>
               </a:lnSpc>
@@ -3628,7 +5298,7 @@
             </a:endParaRPr>
           </a:p>
           <a:p>
-            <a:pPr marL="432000" indent="-323280">
+            <a:pPr marL="432000" indent="-322200">
               <a:lnSpc>
                 <a:spcPct val="100000"/>
               </a:lnSpc>
@@ -3657,7 +5327,7 @@
             </a:endParaRPr>
           </a:p>
           <a:p>
-            <a:pPr marL="432000" indent="-323280">
+            <a:pPr marL="432000" indent="-322200">
               <a:lnSpc>
                 <a:spcPct val="100000"/>
               </a:lnSpc>
@@ -3686,7 +5356,7 @@
             </a:endParaRPr>
           </a:p>
           <a:p>
-            <a:pPr marL="432000" indent="-323280">
+            <a:pPr marL="432000" indent="-322200">
               <a:lnSpc>
                 <a:spcPct val="100000"/>
               </a:lnSpc>
@@ -3715,7 +5385,7 @@
             </a:endParaRPr>
           </a:p>
           <a:p>
-            <a:pPr marL="432000" indent="-323280">
+            <a:pPr marL="432000" indent="-322200">
               <a:lnSpc>
                 <a:spcPct val="100000"/>
               </a:lnSpc>
@@ -3796,14 +5466,14 @@
       </p:grpSpPr>
       <p:sp>
         <p:nvSpPr>
-          <p:cNvPr id="85" name="CustomShape 1"/>
+          <p:cNvPr id="126" name="CustomShape 1"/>
           <p:cNvSpPr/>
           <p:nvPr/>
         </p:nvSpPr>
         <p:spPr>
           <a:xfrm>
             <a:off x="360000" y="301320"/>
-            <a:ext cx="9359280" cy="957960"/>
+            <a:ext cx="9358200" cy="956880"/>
           </a:xfrm>
           <a:prstGeom prst="rect">
             <a:avLst/>
@@ -3845,14 +5515,14 @@
       </p:sp>
       <p:sp>
         <p:nvSpPr>
-          <p:cNvPr id="86" name="CustomShape 2"/>
+          <p:cNvPr id="127" name="CustomShape 2"/>
           <p:cNvSpPr/>
           <p:nvPr/>
         </p:nvSpPr>
         <p:spPr>
           <a:xfrm>
             <a:off x="360000" y="1979640"/>
-            <a:ext cx="9359280" cy="3419640"/>
+            <a:ext cx="9358200" cy="3418560"/>
           </a:xfrm>
           <a:prstGeom prst="rect">
             <a:avLst/>
@@ -3873,7 +5543,7 @@
             <a:normAutofit/>
           </a:bodyPr>
           <a:p>
-            <a:pPr marL="432000" indent="-323280">
+            <a:pPr marL="432000" indent="-322200">
               <a:lnSpc>
                 <a:spcPct val="100000"/>
               </a:lnSpc>
@@ -3902,7 +5572,7 @@
             </a:endParaRPr>
           </a:p>
           <a:p>
-            <a:pPr marL="432000" indent="-323280">
+            <a:pPr marL="432000" indent="-322200">
               <a:lnSpc>
                 <a:spcPct val="100000"/>
               </a:lnSpc>
@@ -3930,8 +5600,118 @@
               <a:latin typeface="Arial"/>
             </a:endParaRPr>
           </a:p>
-        </p:txBody>
-      </p:sp>
+          <a:p>
+            <a:pPr marL="432000" indent="-322200">
+              <a:lnSpc>
+                <a:spcPct val="100000"/>
+              </a:lnSpc>
+              <a:spcAft>
+                <a:spcPts val="1412"/>
+              </a:spcAft>
+              <a:buClr>
+                <a:srgbClr val="2c3e50"/>
+              </a:buClr>
+              <a:buSzPct val="45000"/>
+              <a:buFont typeface="Wingdings" charset="2"/>
+              <a:buChar char=""/>
+            </a:pPr>
+            <a:r>
+              <a:rPr b="1" lang="nl-NL" sz="3200" spc="-1" strike="noStrike">
+                <a:solidFill>
+                  <a:srgbClr val="2c3e50"/>
+                </a:solidFill>
+                <a:latin typeface="Source Sans Pro Semibold"/>
+                <a:ea typeface="DejaVu Sans"/>
+              </a:rPr>
+              <a:t>Product Owner</a:t>
+            </a:r>
+            <a:endParaRPr b="0" lang="nl-NL" sz="3200" spc="-1" strike="noStrike">
+              <a:latin typeface="Arial"/>
+            </a:endParaRPr>
+          </a:p>
+          <a:p>
+            <a:pPr marL="432000" indent="-322200">
+              <a:lnSpc>
+                <a:spcPct val="100000"/>
+              </a:lnSpc>
+              <a:spcAft>
+                <a:spcPts val="1412"/>
+              </a:spcAft>
+              <a:buClr>
+                <a:srgbClr val="2c3e50"/>
+              </a:buClr>
+              <a:buSzPct val="45000"/>
+              <a:buFont typeface="Wingdings" charset="2"/>
+              <a:buChar char=""/>
+            </a:pPr>
+            <a:r>
+              <a:rPr b="1" lang="nl-NL" sz="3200" spc="-1" strike="noStrike">
+                <a:solidFill>
+                  <a:srgbClr val="2c3e50"/>
+                </a:solidFill>
+                <a:latin typeface="Source Sans Pro Semibold"/>
+                <a:ea typeface="DejaVu Sans"/>
+              </a:rPr>
+              <a:t>Development Team</a:t>
+            </a:r>
+            <a:endParaRPr b="0" lang="nl-NL" sz="3200" spc="-1" strike="noStrike">
+              <a:latin typeface="Arial"/>
+            </a:endParaRPr>
+          </a:p>
+          <a:p>
+            <a:pPr marL="432000" indent="-322200">
+              <a:lnSpc>
+                <a:spcPct val="100000"/>
+              </a:lnSpc>
+              <a:spcAft>
+                <a:spcPts val="1412"/>
+              </a:spcAft>
+              <a:buClr>
+                <a:srgbClr val="2c3e50"/>
+              </a:buClr>
+              <a:buSzPct val="45000"/>
+              <a:buFont typeface="Wingdings" charset="2"/>
+              <a:buChar char=""/>
+            </a:pPr>
+            <a:r>
+              <a:rPr b="1" lang="nl-NL" sz="3200" spc="-1" strike="noStrike">
+                <a:solidFill>
+                  <a:srgbClr val="2c3e50"/>
+                </a:solidFill>
+                <a:latin typeface="Source Sans Pro Semibold"/>
+                <a:ea typeface="DejaVu Sans"/>
+              </a:rPr>
+              <a:t>Scrum master</a:t>
+            </a:r>
+            <a:endParaRPr b="0" lang="nl-NL" sz="3200" spc="-1" strike="noStrike">
+              <a:latin typeface="Arial"/>
+            </a:endParaRPr>
+          </a:p>
+        </p:txBody>
+      </p:sp>
+      <p:pic>
+        <p:nvPicPr>
+          <p:cNvPr id="128" name="" descr=""/>
+          <p:cNvPicPr/>
+          <p:nvPr/>
+        </p:nvPicPr>
+        <p:blipFill>
+          <a:blip r:embed="rId1"/>
+          <a:stretch/>
+        </p:blipFill>
+        <p:spPr>
+          <a:xfrm>
+            <a:off x="6088680" y="2088000"/>
+            <a:ext cx="3414960" cy="2561040"/>
+          </a:xfrm>
+          <a:prstGeom prst="rect">
+            <a:avLst/>
+          </a:prstGeom>
+          <a:ln>
+            <a:noFill/>
+          </a:ln>
+        </p:spPr>
+      </p:pic>
     </p:spTree>
   </p:cSld>
   <p:timing>
@@ -3983,14 +5763,14 @@
       </p:grpSpPr>
       <p:sp>
         <p:nvSpPr>
-          <p:cNvPr id="87" name="CustomShape 1"/>
+          <p:cNvPr id="129" name="CustomShape 1"/>
           <p:cNvSpPr/>
           <p:nvPr/>
         </p:nvSpPr>
         <p:spPr>
           <a:xfrm>
             <a:off x="360000" y="301320"/>
-            <a:ext cx="9359280" cy="957960"/>
+            <a:ext cx="9358200" cy="956880"/>
           </a:xfrm>
           <a:prstGeom prst="rect">
             <a:avLst/>
@@ -4032,14 +5812,14 @@
       </p:sp>
       <p:sp>
         <p:nvSpPr>
-          <p:cNvPr id="88" name="CustomShape 2"/>
+          <p:cNvPr id="130" name="CustomShape 2"/>
           <p:cNvSpPr/>
           <p:nvPr/>
         </p:nvSpPr>
         <p:spPr>
           <a:xfrm>
             <a:off x="360000" y="1979640"/>
-            <a:ext cx="9359280" cy="5039280"/>
+            <a:ext cx="9358200" cy="5038200"/>
           </a:xfrm>
           <a:prstGeom prst="rect">
             <a:avLst/>
@@ -4058,14 +5838,14 @@
       </p:sp>
       <p:sp>
         <p:nvSpPr>
-          <p:cNvPr id="89" name="CustomShape 3"/>
+          <p:cNvPr id="131" name="CustomShape 3"/>
           <p:cNvSpPr/>
           <p:nvPr/>
         </p:nvSpPr>
         <p:spPr>
           <a:xfrm>
             <a:off x="360000" y="1979640"/>
-            <a:ext cx="9359280" cy="3419640"/>
+            <a:ext cx="9358200" cy="3418560"/>
           </a:xfrm>
           <a:prstGeom prst="rect">
             <a:avLst/>
@@ -4086,7 +5866,7 @@
             <a:normAutofit/>
           </a:bodyPr>
           <a:p>
-            <a:pPr marL="432000" indent="-323280">
+            <a:pPr marL="432000" indent="-322200">
               <a:lnSpc>
                 <a:spcPct val="100000"/>
               </a:lnSpc>
@@ -4108,14 +5888,14 @@
                 <a:latin typeface="Source Sans Pro Semibold"/>
                 <a:ea typeface="DejaVu Sans"/>
               </a:rPr>
-              <a:t>Agile</a:t>
+              <a:t>Wat staat er in</a:t>
             </a:r>
             <a:endParaRPr b="0" lang="nl-NL" sz="3200" spc="-1" strike="noStrike">
               <a:latin typeface="Arial"/>
             </a:endParaRPr>
           </a:p>
           <a:p>
-            <a:pPr marL="432000" indent="-323280">
+            <a:pPr marL="432000" indent="-322200">
               <a:lnSpc>
                 <a:spcPct val="100000"/>
               </a:lnSpc>
@@ -4137,14 +5917,95 @@
                 <a:latin typeface="Source Sans Pro Semibold"/>
                 <a:ea typeface="DejaVu Sans"/>
               </a:rPr>
-              <a:t>Rollen</a:t>
+              <a:t>Prioriteit</a:t>
             </a:r>
             <a:endParaRPr b="0" lang="nl-NL" sz="3200" spc="-1" strike="noStrike">
               <a:latin typeface="Arial"/>
             </a:endParaRPr>
           </a:p>
-        </p:txBody>
-      </p:sp>
+          <a:p>
+            <a:pPr marL="432000" indent="-322200">
+              <a:lnSpc>
+                <a:spcPct val="100000"/>
+              </a:lnSpc>
+              <a:spcAft>
+                <a:spcPts val="1412"/>
+              </a:spcAft>
+              <a:buClr>
+                <a:srgbClr val="2c3e50"/>
+              </a:buClr>
+              <a:buSzPct val="45000"/>
+              <a:buFont typeface="Wingdings" charset="2"/>
+              <a:buChar char=""/>
+            </a:pPr>
+            <a:r>
+              <a:rPr b="1" lang="nl-NL" sz="3200" spc="-1" strike="noStrike">
+                <a:solidFill>
+                  <a:srgbClr val="2c3e50"/>
+                </a:solidFill>
+                <a:latin typeface="Source Sans Pro Semibold"/>
+                <a:ea typeface="DejaVu Sans"/>
+              </a:rPr>
+              <a:t>MoSCoW</a:t>
+            </a:r>
+            <a:endParaRPr b="0" lang="nl-NL" sz="3200" spc="-1" strike="noStrike">
+              <a:latin typeface="Arial"/>
+            </a:endParaRPr>
+          </a:p>
+          <a:p>
+            <a:pPr marL="432000" indent="-322200">
+              <a:lnSpc>
+                <a:spcPct val="100000"/>
+              </a:lnSpc>
+              <a:spcAft>
+                <a:spcPts val="1412"/>
+              </a:spcAft>
+              <a:buClr>
+                <a:srgbClr val="2c3e50"/>
+              </a:buClr>
+              <a:buSzPct val="45000"/>
+              <a:buFont typeface="Wingdings" charset="2"/>
+              <a:buChar char=""/>
+            </a:pPr>
+            <a:r>
+              <a:rPr b="1" lang="nl-NL" sz="3200" spc="-1" strike="noStrike">
+                <a:solidFill>
+                  <a:srgbClr val="2c3e50"/>
+                </a:solidFill>
+                <a:latin typeface="Source Sans Pro Semibold"/>
+                <a:ea typeface="DejaVu Sans"/>
+              </a:rPr>
+              <a:t>Definition of Done</a:t>
+            </a:r>
+            <a:endParaRPr b="0" lang="nl-NL" sz="3200" spc="-1" strike="noStrike">
+              <a:latin typeface="Arial"/>
+            </a:endParaRPr>
+          </a:p>
+        </p:txBody>
+      </p:sp>
+      <p:pic>
+        <p:nvPicPr>
+          <p:cNvPr id="132" name="" descr=""/>
+          <p:cNvPicPr/>
+          <p:nvPr/>
+        </p:nvPicPr>
+        <p:blipFill>
+          <a:blip r:embed="rId1"/>
+          <a:stretch/>
+        </p:blipFill>
+        <p:spPr>
+          <a:xfrm>
+            <a:off x="5760000" y="2232000"/>
+            <a:ext cx="3383640" cy="2342880"/>
+          </a:xfrm>
+          <a:prstGeom prst="rect">
+            <a:avLst/>
+          </a:prstGeom>
+          <a:ln>
+            <a:noFill/>
+          </a:ln>
+        </p:spPr>
+      </p:pic>
     </p:spTree>
   </p:cSld>
   <p:timing>
@@ -4196,14 +6057,14 @@
       </p:grpSpPr>
       <p:sp>
         <p:nvSpPr>
-          <p:cNvPr id="90" name="CustomShape 1"/>
+          <p:cNvPr id="133" name="CustomShape 1"/>
           <p:cNvSpPr/>
           <p:nvPr/>
         </p:nvSpPr>
         <p:spPr>
           <a:xfrm>
             <a:off x="360000" y="301320"/>
-            <a:ext cx="9359280" cy="957960"/>
+            <a:ext cx="9358200" cy="956880"/>
           </a:xfrm>
           <a:prstGeom prst="rect">
             <a:avLst/>
@@ -4245,14 +6106,14 @@
       </p:sp>
       <p:sp>
         <p:nvSpPr>
-          <p:cNvPr id="91" name="CustomShape 2"/>
+          <p:cNvPr id="134" name="CustomShape 2"/>
           <p:cNvSpPr/>
           <p:nvPr/>
         </p:nvSpPr>
         <p:spPr>
           <a:xfrm>
             <a:off x="360000" y="1979640"/>
-            <a:ext cx="9359280" cy="5039280"/>
+            <a:ext cx="9358200" cy="5038200"/>
           </a:xfrm>
           <a:prstGeom prst="rect">
             <a:avLst/>
@@ -4268,6 +6129,205 @@
           <a:effectRef idx="0"/>
           <a:fontRef idx="minor"/>
         </p:style>
+      </p:sp>
+      <p:pic>
+        <p:nvPicPr>
+          <p:cNvPr id="135" name="" descr=""/>
+          <p:cNvPicPr/>
+          <p:nvPr/>
+        </p:nvPicPr>
+        <p:blipFill>
+          <a:blip r:embed="rId1"/>
+          <a:stretch/>
+        </p:blipFill>
+        <p:spPr>
+          <a:xfrm>
+            <a:off x="7056000" y="1816560"/>
+            <a:ext cx="2603880" cy="3510720"/>
+          </a:xfrm>
+          <a:prstGeom prst="rect">
+            <a:avLst/>
+          </a:prstGeom>
+          <a:ln>
+            <a:noFill/>
+          </a:ln>
+        </p:spPr>
+      </p:pic>
+      <p:sp>
+        <p:nvSpPr>
+          <p:cNvPr id="136" name="CustomShape 3"/>
+          <p:cNvSpPr/>
+          <p:nvPr/>
+        </p:nvSpPr>
+        <p:spPr>
+          <a:xfrm>
+            <a:off x="360000" y="1979640"/>
+            <a:ext cx="9358200" cy="3418560"/>
+          </a:xfrm>
+          <a:prstGeom prst="rect">
+            <a:avLst/>
+          </a:prstGeom>
+          <a:noFill/>
+          <a:ln>
+            <a:noFill/>
+          </a:ln>
+        </p:spPr>
+        <p:style>
+          <a:lnRef idx="0"/>
+          <a:fillRef idx="0"/>
+          <a:effectRef idx="0"/>
+          <a:fontRef idx="minor"/>
+        </p:style>
+        <p:txBody>
+          <a:bodyPr lIns="0" rIns="0" tIns="0" bIns="0">
+            <a:normAutofit/>
+          </a:bodyPr>
+          <a:p>
+            <a:pPr marL="432000" indent="-322200">
+              <a:lnSpc>
+                <a:spcPct val="100000"/>
+              </a:lnSpc>
+              <a:spcAft>
+                <a:spcPts val="1412"/>
+              </a:spcAft>
+              <a:buClr>
+                <a:srgbClr val="2c3e50"/>
+              </a:buClr>
+              <a:buSzPct val="45000"/>
+              <a:buFont typeface="Wingdings" charset="2"/>
+              <a:buChar char=""/>
+            </a:pPr>
+            <a:r>
+              <a:rPr b="1" lang="nl-NL" sz="3200" spc="-1" strike="noStrike">
+                <a:solidFill>
+                  <a:srgbClr val="2c3e50"/>
+                </a:solidFill>
+                <a:latin typeface="Source Sans Pro Semibold"/>
+                <a:ea typeface="DejaVu Sans"/>
+              </a:rPr>
+              <a:t>Sprint</a:t>
+            </a:r>
+            <a:endParaRPr b="0" lang="nl-NL" sz="3200" spc="-1" strike="noStrike">
+              <a:latin typeface="Arial"/>
+            </a:endParaRPr>
+          </a:p>
+          <a:p>
+            <a:pPr marL="432000" indent="-322200">
+              <a:lnSpc>
+                <a:spcPct val="100000"/>
+              </a:lnSpc>
+              <a:spcAft>
+                <a:spcPts val="1412"/>
+              </a:spcAft>
+              <a:buClr>
+                <a:srgbClr val="2c3e50"/>
+              </a:buClr>
+              <a:buSzPct val="45000"/>
+              <a:buFont typeface="Wingdings" charset="2"/>
+              <a:buChar char=""/>
+            </a:pPr>
+            <a:r>
+              <a:rPr b="1" lang="nl-NL" sz="3200" spc="-1" strike="noStrike">
+                <a:solidFill>
+                  <a:srgbClr val="2c3e50"/>
+                </a:solidFill>
+                <a:latin typeface="Source Sans Pro Semibold"/>
+                <a:ea typeface="DejaVu Sans"/>
+              </a:rPr>
+              <a:t>User stories</a:t>
+            </a:r>
+            <a:endParaRPr b="0" lang="nl-NL" sz="3200" spc="-1" strike="noStrike">
+              <a:latin typeface="Arial"/>
+            </a:endParaRPr>
+          </a:p>
+          <a:p>
+            <a:pPr marL="432000" indent="-322200">
+              <a:lnSpc>
+                <a:spcPct val="100000"/>
+              </a:lnSpc>
+              <a:spcAft>
+                <a:spcPts val="1412"/>
+              </a:spcAft>
+              <a:buClr>
+                <a:srgbClr val="2c3e50"/>
+              </a:buClr>
+              <a:buSzPct val="45000"/>
+              <a:buFont typeface="Wingdings" charset="2"/>
+              <a:buChar char=""/>
+            </a:pPr>
+            <a:r>
+              <a:rPr b="1" lang="nl-NL" sz="3200" spc="-1" strike="noStrike">
+                <a:solidFill>
+                  <a:srgbClr val="2c3e50"/>
+                </a:solidFill>
+                <a:latin typeface="Source Sans Pro Semibold"/>
+                <a:ea typeface="DejaVu Sans"/>
+              </a:rPr>
+              <a:t>Taken</a:t>
+            </a:r>
+            <a:endParaRPr b="0" lang="nl-NL" sz="3200" spc="-1" strike="noStrike">
+              <a:latin typeface="Arial"/>
+            </a:endParaRPr>
+          </a:p>
+          <a:p>
+            <a:pPr marL="432000" indent="-322200">
+              <a:lnSpc>
+                <a:spcPct val="100000"/>
+              </a:lnSpc>
+              <a:spcAft>
+                <a:spcPts val="1412"/>
+              </a:spcAft>
+              <a:buClr>
+                <a:srgbClr val="2c3e50"/>
+              </a:buClr>
+              <a:buSzPct val="45000"/>
+              <a:buFont typeface="Wingdings" charset="2"/>
+              <a:buChar char=""/>
+            </a:pPr>
+            <a:r>
+              <a:rPr b="1" lang="nl-NL" sz="3200" spc="-1" strike="noStrike">
+                <a:solidFill>
+                  <a:srgbClr val="2c3e50"/>
+                </a:solidFill>
+                <a:latin typeface="Source Sans Pro Semibold"/>
+                <a:ea typeface="DejaVu Sans"/>
+              </a:rPr>
+              <a:t>Acceptatie criteria</a:t>
+            </a:r>
+            <a:endParaRPr b="0" lang="nl-NL" sz="3200" spc="-1" strike="noStrike">
+              <a:latin typeface="Arial"/>
+            </a:endParaRPr>
+          </a:p>
+          <a:p>
+            <a:pPr marL="432000" indent="-322200">
+              <a:lnSpc>
+                <a:spcPct val="100000"/>
+              </a:lnSpc>
+              <a:spcAft>
+                <a:spcPts val="1412"/>
+              </a:spcAft>
+              <a:buClr>
+                <a:srgbClr val="2c3e50"/>
+              </a:buClr>
+              <a:buSzPct val="45000"/>
+              <a:buFont typeface="Wingdings" charset="2"/>
+              <a:buChar char=""/>
+            </a:pPr>
+            <a:r>
+              <a:rPr b="1" lang="nl-NL" sz="3200" spc="-1" strike="noStrike">
+                <a:solidFill>
+                  <a:srgbClr val="2c3e50"/>
+                </a:solidFill>
+                <a:latin typeface="Source Sans Pro Semibold"/>
+                <a:ea typeface="DejaVu Sans"/>
+              </a:rPr>
+              <a:t>Prioriteiten MoSCoW</a:t>
+            </a:r>
+            <a:endParaRPr b="0" lang="nl-NL" sz="3200" spc="-1" strike="noStrike">
+              <a:latin typeface="Arial"/>
+            </a:endParaRPr>
+          </a:p>
+        </p:txBody>
       </p:sp>
     </p:spTree>
   </p:cSld>
@@ -4320,14 +6380,14 @@
       </p:grpSpPr>
       <p:sp>
         <p:nvSpPr>
-          <p:cNvPr id="92" name="CustomShape 1"/>
+          <p:cNvPr id="137" name="CustomShape 1"/>
           <p:cNvSpPr/>
           <p:nvPr/>
         </p:nvSpPr>
         <p:spPr>
           <a:xfrm>
             <a:off x="360000" y="301320"/>
-            <a:ext cx="9359280" cy="957960"/>
+            <a:ext cx="9358200" cy="956880"/>
           </a:xfrm>
           <a:prstGeom prst="rect">
             <a:avLst/>
@@ -4369,14 +6429,14 @@
       </p:sp>
       <p:sp>
         <p:nvSpPr>
-          <p:cNvPr id="93" name="CustomShape 2"/>
+          <p:cNvPr id="138" name="CustomShape 2"/>
           <p:cNvSpPr/>
           <p:nvPr/>
         </p:nvSpPr>
         <p:spPr>
           <a:xfrm>
             <a:off x="360000" y="1979640"/>
-            <a:ext cx="9359280" cy="5039280"/>
+            <a:ext cx="9358200" cy="5038200"/>
           </a:xfrm>
           <a:prstGeom prst="rect">
             <a:avLst/>
@@ -4393,6 +6453,147 @@
           <a:fontRef idx="minor"/>
         </p:style>
       </p:sp>
+      <p:sp>
+        <p:nvSpPr>
+          <p:cNvPr id="139" name="CustomShape 3"/>
+          <p:cNvSpPr/>
+          <p:nvPr/>
+        </p:nvSpPr>
+        <p:spPr>
+          <a:xfrm>
+            <a:off x="360000" y="1979640"/>
+            <a:ext cx="9358200" cy="3418560"/>
+          </a:xfrm>
+          <a:prstGeom prst="rect">
+            <a:avLst/>
+          </a:prstGeom>
+          <a:noFill/>
+          <a:ln>
+            <a:noFill/>
+          </a:ln>
+        </p:spPr>
+        <p:style>
+          <a:lnRef idx="0"/>
+          <a:fillRef idx="0"/>
+          <a:effectRef idx="0"/>
+          <a:fontRef idx="minor"/>
+        </p:style>
+        <p:txBody>
+          <a:bodyPr lIns="0" rIns="0" tIns="0" bIns="0">
+            <a:normAutofit/>
+          </a:bodyPr>
+          <a:p>
+            <a:pPr marL="432000" indent="-322200">
+              <a:lnSpc>
+                <a:spcPct val="100000"/>
+              </a:lnSpc>
+              <a:spcAft>
+                <a:spcPts val="1412"/>
+              </a:spcAft>
+              <a:buClr>
+                <a:srgbClr val="2c3e50"/>
+              </a:buClr>
+              <a:buSzPct val="45000"/>
+              <a:buFont typeface="Wingdings" charset="2"/>
+              <a:buChar char=""/>
+            </a:pPr>
+            <a:r>
+              <a:rPr b="1" lang="nl-NL" sz="3200" spc="-1" strike="noStrike">
+                <a:solidFill>
+                  <a:srgbClr val="2c3e50"/>
+                </a:solidFill>
+                <a:latin typeface="Source Sans Pro Semibold"/>
+                <a:ea typeface="DejaVu Sans"/>
+              </a:rPr>
+              <a:t>Vast tijdsbestek</a:t>
+            </a:r>
+            <a:endParaRPr b="0" lang="nl-NL" sz="3200" spc="-1" strike="noStrike">
+              <a:latin typeface="Arial"/>
+            </a:endParaRPr>
+          </a:p>
+          <a:p>
+            <a:pPr marL="432000" indent="-322200">
+              <a:lnSpc>
+                <a:spcPct val="100000"/>
+              </a:lnSpc>
+              <a:spcAft>
+                <a:spcPts val="1412"/>
+              </a:spcAft>
+              <a:buClr>
+                <a:srgbClr val="2c3e50"/>
+              </a:buClr>
+              <a:buSzPct val="45000"/>
+              <a:buFont typeface="Wingdings" charset="2"/>
+              <a:buChar char=""/>
+            </a:pPr>
+            <a:r>
+              <a:rPr b="1" lang="nl-NL" sz="3200" spc="-1" strike="noStrike">
+                <a:solidFill>
+                  <a:srgbClr val="2c3e50"/>
+                </a:solidFill>
+                <a:latin typeface="Source Sans Pro Semibold"/>
+                <a:ea typeface="DejaVu Sans"/>
+              </a:rPr>
+              <a:t>Wat doen ze tijdens de sprint</a:t>
+            </a:r>
+            <a:endParaRPr b="0" lang="nl-NL" sz="3200" spc="-1" strike="noStrike">
+              <a:latin typeface="Arial"/>
+            </a:endParaRPr>
+          </a:p>
+          <a:p>
+            <a:pPr marL="432000" indent="-322200">
+              <a:lnSpc>
+                <a:spcPct val="100000"/>
+              </a:lnSpc>
+              <a:spcAft>
+                <a:spcPts val="1412"/>
+              </a:spcAft>
+              <a:buClr>
+                <a:srgbClr val="2c3e50"/>
+              </a:buClr>
+              <a:buSzPct val="45000"/>
+              <a:buFont typeface="Wingdings" charset="2"/>
+              <a:buChar char=""/>
+            </a:pPr>
+            <a:r>
+              <a:rPr b="1" lang="nl-NL" sz="3200" spc="-1" strike="noStrike">
+                <a:solidFill>
+                  <a:srgbClr val="2c3e50"/>
+                </a:solidFill>
+                <a:latin typeface="Source Sans Pro Semibold"/>
+                <a:ea typeface="DejaVu Sans"/>
+              </a:rPr>
+              <a:t>Sprint review</a:t>
+            </a:r>
+            <a:endParaRPr b="0" lang="nl-NL" sz="3200" spc="-1" strike="noStrike">
+              <a:latin typeface="Arial"/>
+            </a:endParaRPr>
+          </a:p>
+        </p:txBody>
+      </p:sp>
+      <p:pic>
+        <p:nvPicPr>
+          <p:cNvPr id="140" name="" descr=""/>
+          <p:cNvPicPr/>
+          <p:nvPr/>
+        </p:nvPicPr>
+        <p:blipFill>
+          <a:blip r:embed="rId1"/>
+          <a:stretch/>
+        </p:blipFill>
+        <p:spPr>
+          <a:xfrm>
+            <a:off x="6635520" y="2099520"/>
+            <a:ext cx="2796120" cy="2796120"/>
+          </a:xfrm>
+          <a:prstGeom prst="rect">
+            <a:avLst/>
+          </a:prstGeom>
+          <a:ln>
+            <a:noFill/>
+          </a:ln>
+        </p:spPr>
+      </p:pic>
     </p:spTree>
   </p:cSld>
   <p:timing>
@@ -4444,14 +6645,14 @@
       </p:grpSpPr>
       <p:sp>
         <p:nvSpPr>
-          <p:cNvPr id="94" name="CustomShape 1"/>
+          <p:cNvPr id="141" name="CustomShape 1"/>
           <p:cNvSpPr/>
           <p:nvPr/>
         </p:nvSpPr>
         <p:spPr>
           <a:xfrm>
             <a:off x="360000" y="301320"/>
-            <a:ext cx="9359280" cy="957960"/>
+            <a:ext cx="9358200" cy="956880"/>
           </a:xfrm>
           <a:prstGeom prst="rect">
             <a:avLst/>
@@ -4493,14 +6694,14 @@
       </p:sp>
       <p:sp>
         <p:nvSpPr>
-          <p:cNvPr id="95" name="CustomShape 2"/>
+          <p:cNvPr id="142" name="CustomShape 2"/>
           <p:cNvSpPr/>
           <p:nvPr/>
         </p:nvSpPr>
         <p:spPr>
           <a:xfrm>
             <a:off x="360000" y="1979640"/>
-            <a:ext cx="9359280" cy="5039280"/>
+            <a:ext cx="9358200" cy="5038200"/>
           </a:xfrm>
           <a:prstGeom prst="rect">
             <a:avLst/>
@@ -4517,6 +6718,147 @@
           <a:fontRef idx="minor"/>
         </p:style>
       </p:sp>
+      <p:sp>
+        <p:nvSpPr>
+          <p:cNvPr id="143" name="CustomShape 3"/>
+          <p:cNvSpPr/>
+          <p:nvPr/>
+        </p:nvSpPr>
+        <p:spPr>
+          <a:xfrm>
+            <a:off x="360000" y="1979640"/>
+            <a:ext cx="9358200" cy="3418560"/>
+          </a:xfrm>
+          <a:prstGeom prst="rect">
+            <a:avLst/>
+          </a:prstGeom>
+          <a:noFill/>
+          <a:ln>
+            <a:noFill/>
+          </a:ln>
+        </p:spPr>
+        <p:style>
+          <a:lnRef idx="0"/>
+          <a:fillRef idx="0"/>
+          <a:effectRef idx="0"/>
+          <a:fontRef idx="minor"/>
+        </p:style>
+        <p:txBody>
+          <a:bodyPr lIns="0" rIns="0" tIns="0" bIns="0">
+            <a:normAutofit/>
+          </a:bodyPr>
+          <a:p>
+            <a:pPr marL="432000" indent="-322200">
+              <a:lnSpc>
+                <a:spcPct val="100000"/>
+              </a:lnSpc>
+              <a:spcAft>
+                <a:spcPts val="1412"/>
+              </a:spcAft>
+              <a:buClr>
+                <a:srgbClr val="2c3e50"/>
+              </a:buClr>
+              <a:buSzPct val="45000"/>
+              <a:buFont typeface="Wingdings" charset="2"/>
+              <a:buChar char=""/>
+            </a:pPr>
+            <a:r>
+              <a:rPr b="1" lang="nl-NL" sz="3200" spc="-1" strike="noStrike">
+                <a:solidFill>
+                  <a:srgbClr val="2c3e50"/>
+                </a:solidFill>
+                <a:latin typeface="Source Sans Pro Semibold"/>
+                <a:ea typeface="DejaVu Sans"/>
+              </a:rPr>
+              <a:t>Dagelijks</a:t>
+            </a:r>
+            <a:endParaRPr b="0" lang="nl-NL" sz="3200" spc="-1" strike="noStrike">
+              <a:latin typeface="Arial"/>
+            </a:endParaRPr>
+          </a:p>
+          <a:p>
+            <a:pPr marL="432000" indent="-322200">
+              <a:lnSpc>
+                <a:spcPct val="100000"/>
+              </a:lnSpc>
+              <a:spcAft>
+                <a:spcPts val="1412"/>
+              </a:spcAft>
+              <a:buClr>
+                <a:srgbClr val="2c3e50"/>
+              </a:buClr>
+              <a:buSzPct val="45000"/>
+              <a:buFont typeface="Wingdings" charset="2"/>
+              <a:buChar char=""/>
+            </a:pPr>
+            <a:r>
+              <a:rPr b="1" lang="nl-NL" sz="3200" spc="-1" strike="noStrike">
+                <a:solidFill>
+                  <a:srgbClr val="2c3e50"/>
+                </a:solidFill>
+                <a:latin typeface="Source Sans Pro Semibold"/>
+                <a:ea typeface="DejaVu Sans"/>
+              </a:rPr>
+              <a:t>Tijdslimiet</a:t>
+            </a:r>
+            <a:endParaRPr b="0" lang="nl-NL" sz="3200" spc="-1" strike="noStrike">
+              <a:latin typeface="Arial"/>
+            </a:endParaRPr>
+          </a:p>
+          <a:p>
+            <a:pPr marL="432000" indent="-322200">
+              <a:lnSpc>
+                <a:spcPct val="100000"/>
+              </a:lnSpc>
+              <a:spcAft>
+                <a:spcPts val="1412"/>
+              </a:spcAft>
+              <a:buClr>
+                <a:srgbClr val="2c3e50"/>
+              </a:buClr>
+              <a:buSzPct val="45000"/>
+              <a:buFont typeface="Wingdings" charset="2"/>
+              <a:buChar char=""/>
+            </a:pPr>
+            <a:r>
+              <a:rPr b="1" lang="nl-NL" sz="3200" spc="-1" strike="noStrike">
+                <a:solidFill>
+                  <a:srgbClr val="2c3e50"/>
+                </a:solidFill>
+                <a:latin typeface="Source Sans Pro Semibold"/>
+                <a:ea typeface="DejaVu Sans"/>
+              </a:rPr>
+              <a:t>Vragen</a:t>
+            </a:r>
+            <a:endParaRPr b="0" lang="nl-NL" sz="3200" spc="-1" strike="noStrike">
+              <a:latin typeface="Arial"/>
+            </a:endParaRPr>
+          </a:p>
+        </p:txBody>
+      </p:sp>
+      <p:pic>
+        <p:nvPicPr>
+          <p:cNvPr id="144" name="" descr=""/>
+          <p:cNvPicPr/>
+          <p:nvPr/>
+        </p:nvPicPr>
+        <p:blipFill>
+          <a:blip r:embed="rId1"/>
+          <a:stretch/>
+        </p:blipFill>
+        <p:spPr>
+          <a:xfrm>
+            <a:off x="5058720" y="1979640"/>
+            <a:ext cx="4659480" cy="2853360"/>
+          </a:xfrm>
+          <a:prstGeom prst="rect">
+            <a:avLst/>
+          </a:prstGeom>
+          <a:ln>
+            <a:noFill/>
+          </a:ln>
+        </p:spPr>
+      </p:pic>
     </p:spTree>
   </p:cSld>
   <p:timing>
@@ -4568,14 +6910,14 @@
       </p:grpSpPr>
       <p:sp>
         <p:nvSpPr>
-          <p:cNvPr id="96" name="CustomShape 1"/>
+          <p:cNvPr id="145" name="CustomShape 1"/>
           <p:cNvSpPr/>
           <p:nvPr/>
         </p:nvSpPr>
         <p:spPr>
           <a:xfrm>
             <a:off x="360000" y="301320"/>
-            <a:ext cx="9359280" cy="957960"/>
+            <a:ext cx="9358200" cy="956880"/>
           </a:xfrm>
           <a:prstGeom prst="rect">
             <a:avLst/>
@@ -4617,14 +6959,14 @@
       </p:sp>
       <p:sp>
         <p:nvSpPr>
-          <p:cNvPr id="97" name="CustomShape 2"/>
+          <p:cNvPr id="146" name="CustomShape 2"/>
           <p:cNvSpPr/>
           <p:nvPr/>
         </p:nvSpPr>
         <p:spPr>
           <a:xfrm>
             <a:off x="360000" y="1979640"/>
-            <a:ext cx="9359280" cy="5039280"/>
+            <a:ext cx="9358200" cy="5038200"/>
           </a:xfrm>
           <a:prstGeom prst="rect">
             <a:avLst/>
@@ -4641,6 +6983,118 @@
           <a:fontRef idx="minor"/>
         </p:style>
       </p:sp>
+      <p:sp>
+        <p:nvSpPr>
+          <p:cNvPr id="147" name="CustomShape 3"/>
+          <p:cNvSpPr/>
+          <p:nvPr/>
+        </p:nvSpPr>
+        <p:spPr>
+          <a:xfrm>
+            <a:off x="360000" y="1979640"/>
+            <a:ext cx="9358200" cy="3418560"/>
+          </a:xfrm>
+          <a:prstGeom prst="rect">
+            <a:avLst/>
+          </a:prstGeom>
+          <a:noFill/>
+          <a:ln>
+            <a:noFill/>
+          </a:ln>
+        </p:spPr>
+        <p:style>
+          <a:lnRef idx="0"/>
+          <a:fillRef idx="0"/>
+          <a:effectRef idx="0"/>
+          <a:fontRef idx="minor"/>
+        </p:style>
+        <p:txBody>
+          <a:bodyPr lIns="0" rIns="0" tIns="0" bIns="0">
+            <a:normAutofit/>
+          </a:bodyPr>
+          <a:p>
+            <a:pPr marL="432000" indent="-322200">
+              <a:lnSpc>
+                <a:spcPct val="100000"/>
+              </a:lnSpc>
+              <a:spcAft>
+                <a:spcPts val="1412"/>
+              </a:spcAft>
+              <a:buClr>
+                <a:srgbClr val="2c3e50"/>
+              </a:buClr>
+              <a:buSzPct val="45000"/>
+              <a:buFont typeface="Wingdings" charset="2"/>
+              <a:buChar char=""/>
+            </a:pPr>
+            <a:r>
+              <a:rPr b="1" lang="nl-NL" sz="3200" spc="-1" strike="noStrike">
+                <a:solidFill>
+                  <a:srgbClr val="2c3e50"/>
+                </a:solidFill>
+                <a:latin typeface="Source Sans Pro Semibold"/>
+                <a:ea typeface="DejaVu Sans"/>
+              </a:rPr>
+              <a:t>Product na een sprint</a:t>
+            </a:r>
+            <a:endParaRPr b="0" lang="nl-NL" sz="3200" spc="-1" strike="noStrike">
+              <a:latin typeface="Arial"/>
+            </a:endParaRPr>
+          </a:p>
+          <a:p>
+            <a:pPr marL="432000" indent="-322200">
+              <a:lnSpc>
+                <a:spcPct val="100000"/>
+              </a:lnSpc>
+              <a:spcAft>
+                <a:spcPts val="1412"/>
+              </a:spcAft>
+              <a:buClr>
+                <a:srgbClr val="2c3e50"/>
+              </a:buClr>
+              <a:buSzPct val="45000"/>
+              <a:buFont typeface="Wingdings" charset="2"/>
+              <a:buChar char=""/>
+            </a:pPr>
+            <a:r>
+              <a:rPr b="1" lang="nl-NL" sz="3200" spc="-1" strike="noStrike">
+                <a:solidFill>
+                  <a:srgbClr val="2c3e50"/>
+                </a:solidFill>
+                <a:latin typeface="Source Sans Pro Semibold"/>
+                <a:ea typeface="DejaVu Sans"/>
+              </a:rPr>
+              <a:t>Eisen oftewel Definition of Done</a:t>
+            </a:r>
+            <a:endParaRPr b="0" lang="nl-NL" sz="3200" spc="-1" strike="noStrike">
+              <a:latin typeface="Arial"/>
+            </a:endParaRPr>
+          </a:p>
+        </p:txBody>
+      </p:sp>
+      <p:pic>
+        <p:nvPicPr>
+          <p:cNvPr id="148" name="" descr=""/>
+          <p:cNvPicPr/>
+          <p:nvPr/>
+        </p:nvPicPr>
+        <p:blipFill>
+          <a:blip r:embed="rId1"/>
+          <a:stretch/>
+        </p:blipFill>
+        <p:spPr>
+          <a:xfrm>
+            <a:off x="6431040" y="3103200"/>
+            <a:ext cx="3144600" cy="2224440"/>
+          </a:xfrm>
+          <a:prstGeom prst="rect">
+            <a:avLst/>
+          </a:prstGeom>
+          <a:ln>
+            <a:noFill/>
+          </a:ln>
+        </p:spPr>
+      </p:pic>
     </p:spTree>
   </p:cSld>
   <p:timing>
@@ -4650,6 +7104,127 @@
           <p:childTnLst>
             <p:seq>
               <p:cTn id="16" nodeType="mainSeq"/>
+              <p:prevCondLst>
+                <p:cond delay="0" evt="onPrev">
+                  <p:tgtEl>
+                    <p:sldTgt/>
+                  </p:tgtEl>
+                </p:cond>
+              </p:prevCondLst>
+              <p:nextCondLst>
+                <p:cond delay="0" evt="onNext">
+                  <p:tgtEl>
+                    <p:sldTgt/>
+                  </p:tgtEl>
+                </p:cond>
+              </p:nextCondLst>
+            </p:seq>
+          </p:childTnLst>
+        </p:cTn>
+      </p:par>
+    </p:tnLst>
+  </p:timing>
+</p:sld>
+</file>
+
+<file path=ppt/slides/slide9.xml><?xml version="1.0" encoding="utf-8"?>
+<p:sld xmlns:a="http://schemas.openxmlformats.org/drawingml/2006/main" xmlns:p="http://schemas.openxmlformats.org/presentationml/2006/main" xmlns:r="http://schemas.openxmlformats.org/officeDocument/2006/relationships" xmlns:p14="http://schemas.microsoft.com/office/powerpoint/2010/main" xmlns:p15="http://schemas.microsoft.com/office/powerpoint/2012/main" xmlns:mc="http://schemas.openxmlformats.org/markup-compatibility/2006">
+  <p:cSld>
+    <p:spTree>
+      <p:nvGrpSpPr>
+        <p:cNvPr id="1" name=""/>
+        <p:cNvGrpSpPr/>
+        <p:nvPr/>
+      </p:nvGrpSpPr>
+      <p:grpSpPr>
+        <a:xfrm>
+          <a:off x="0" y="0"/>
+          <a:ext cx="0" cy="0"/>
+          <a:chOff x="0" y="0"/>
+          <a:chExt cx="0" cy="0"/>
+        </a:xfrm>
+      </p:grpSpPr>
+      <p:sp>
+        <p:nvSpPr>
+          <p:cNvPr id="149" name="CustomShape 1"/>
+          <p:cNvSpPr/>
+          <p:nvPr/>
+        </p:nvSpPr>
+        <p:spPr>
+          <a:xfrm>
+            <a:off x="360000" y="301320"/>
+            <a:ext cx="9358200" cy="956880"/>
+          </a:xfrm>
+          <a:prstGeom prst="rect">
+            <a:avLst/>
+          </a:prstGeom>
+          <a:noFill/>
+          <a:ln>
+            <a:noFill/>
+          </a:ln>
+        </p:spPr>
+        <p:style>
+          <a:lnRef idx="0"/>
+          <a:fillRef idx="0"/>
+          <a:effectRef idx="0"/>
+          <a:fontRef idx="minor"/>
+        </p:style>
+        <p:txBody>
+          <a:bodyPr lIns="0" rIns="0" tIns="0" bIns="0" anchor="ctr"/>
+          <a:p>
+            <a:pPr algn="ctr">
+              <a:lnSpc>
+                <a:spcPct val="100000"/>
+              </a:lnSpc>
+            </a:pPr>
+            <a:r>
+              <a:rPr b="1" lang="nl-NL" sz="3600" spc="-1" strike="noStrike">
+                <a:solidFill>
+                  <a:srgbClr val="ffffff"/>
+                </a:solidFill>
+                <a:latin typeface="Source Sans Pro Black"/>
+                <a:ea typeface="DejaVu Sans"/>
+              </a:rPr>
+              <a:t>Vragen?</a:t>
+            </a:r>
+            <a:endParaRPr b="0" lang="nl-NL" sz="3600" spc="-1" strike="noStrike">
+              <a:latin typeface="Arial"/>
+            </a:endParaRPr>
+          </a:p>
+        </p:txBody>
+      </p:sp>
+      <p:pic>
+        <p:nvPicPr>
+          <p:cNvPr id="150" name="" descr=""/>
+          <p:cNvPicPr/>
+          <p:nvPr/>
+        </p:nvPicPr>
+        <p:blipFill>
+          <a:blip r:embed="rId1"/>
+          <a:stretch/>
+        </p:blipFill>
+        <p:spPr>
+          <a:xfrm>
+            <a:off x="4208040" y="1944000"/>
+            <a:ext cx="1767960" cy="3403800"/>
+          </a:xfrm>
+          <a:prstGeom prst="rect">
+            <a:avLst/>
+          </a:prstGeom>
+          <a:ln>
+            <a:noFill/>
+          </a:ln>
+        </p:spPr>
+      </p:pic>
+    </p:spTree>
+  </p:cSld>
+  <p:timing>
+    <p:tnLst>
+      <p:par>
+        <p:cTn id="17" dur="indefinite" restart="never" nodeType="tmRoot">
+          <p:childTnLst>
+            <p:seq>
+              <p:cTn id="18" nodeType="mainSeq"/>
               <p:prevCondLst>
                 <p:cond delay="0" evt="onPrev">
                   <p:tgtEl>
@@ -5117,4 +7692,227 @@
     </a:fmtScheme>
   </a:themeElements>
 </a:theme>
+</file>
+
+<file path=ppt/theme/theme3.xml><?xml version="1.0" encoding="utf-8"?>
+<a:theme xmlns:a="http://schemas.openxmlformats.org/drawingml/2006/main" name="Office Theme">
+  <a:themeElements>
+    <a:clrScheme name="Office">
+      <a:dk1>
+        <a:sysClr val="windowText" lastClr="000000"/>
+      </a:dk1>
+      <a:lt1>
+        <a:sysClr val="window" lastClr="FFFFFF"/>
+      </a:lt1>
+      <a:dk2>
+        <a:srgbClr val="1F497D"/>
+      </a:dk2>
+      <a:lt2>
+        <a:srgbClr val="EEECE1"/>
+      </a:lt2>
+      <a:accent1>
+        <a:srgbClr val="4F81BD"/>
+      </a:accent1>
+      <a:accent2>
+        <a:srgbClr val="C0504D"/>
+      </a:accent2>
+      <a:accent3>
+        <a:srgbClr val="9BBB59"/>
+      </a:accent3>
+      <a:accent4>
+        <a:srgbClr val="8064A2"/>
+      </a:accent4>
+      <a:accent5>
+        <a:srgbClr val="4BACC6"/>
+      </a:accent5>
+      <a:accent6>
+        <a:srgbClr val="F79646"/>
+      </a:accent6>
+      <a:hlink>
+        <a:srgbClr val="0000FF"/>
+      </a:hlink>
+      <a:folHlink>
+        <a:srgbClr val="800080"/>
+      </a:folHlink>
+    </a:clrScheme>
+    <a:fontScheme name="Office">
+      <a:majorFont>
+        <a:latin typeface="Arial"/>
+        <a:ea typeface="DejaVu Sans"/>
+        <a:cs typeface="DejaVu Sans"/>
+      </a:majorFont>
+      <a:minorFont>
+        <a:latin typeface="Arial"/>
+        <a:ea typeface="DejaVu Sans"/>
+        <a:cs typeface="DejaVu Sans"/>
+      </a:minorFont>
+    </a:fontScheme>
+    <a:fmtScheme name="Office">
+      <a:fillStyleLst>
+        <a:solidFill>
+          <a:schemeClr val="phClr"/>
+        </a:solidFill>
+        <a:gradFill rotWithShape="1">
+          <a:gsLst>
+            <a:gs pos="0">
+              <a:schemeClr val="phClr">
+                <a:tint val="50000"/>
+                <a:satMod val="300000"/>
+              </a:schemeClr>
+            </a:gs>
+            <a:gs pos="35000">
+              <a:schemeClr val="phClr">
+                <a:tint val="37000"/>
+                <a:satMod val="300000"/>
+              </a:schemeClr>
+            </a:gs>
+            <a:gs pos="100000">
+              <a:schemeClr val="phClr">
+                <a:tint val="15000"/>
+                <a:satMod val="350000"/>
+              </a:schemeClr>
+            </a:gs>
+          </a:gsLst>
+          <a:lin ang="16200000" scaled="1"/>
+        </a:gradFill>
+        <a:gradFill rotWithShape="1">
+          <a:gsLst>
+            <a:gs pos="0">
+              <a:schemeClr val="phClr">
+                <a:shade val="51000"/>
+                <a:satMod val="130000"/>
+              </a:schemeClr>
+            </a:gs>
+            <a:gs pos="80000">
+              <a:schemeClr val="phClr">
+                <a:shade val="93000"/>
+                <a:satMod val="130000"/>
+              </a:schemeClr>
+            </a:gs>
+            <a:gs pos="100000">
+              <a:schemeClr val="phClr">
+                <a:shade val="94000"/>
+                <a:satMod val="135000"/>
+              </a:schemeClr>
+            </a:gs>
+          </a:gsLst>
+          <a:lin ang="16200000" scaled="0"/>
+        </a:gradFill>
+      </a:fillStyleLst>
+      <a:lnStyleLst>
+        <a:ln w="9525" cap="flat" cmpd="sng" algn="ctr">
+          <a:solidFill>
+            <a:schemeClr val="phClr">
+              <a:shade val="95000"/>
+              <a:satMod val="105000"/>
+            </a:schemeClr>
+          </a:solidFill>
+          <a:prstDash val="solid"/>
+        </a:ln>
+        <a:ln w="25400" cap="flat" cmpd="sng" algn="ctr">
+          <a:solidFill>
+            <a:schemeClr val="phClr"/>
+          </a:solidFill>
+          <a:prstDash val="solid"/>
+        </a:ln>
+        <a:ln w="38100" cap="flat" cmpd="sng" algn="ctr">
+          <a:solidFill>
+            <a:schemeClr val="phClr"/>
+          </a:solidFill>
+          <a:prstDash val="solid"/>
+        </a:ln>
+      </a:lnStyleLst>
+      <a:effectStyleLst>
+        <a:effectStyle>
+          <a:effectLst>
+            <a:outerShdw blurRad="40000" dist="20000" dir="5400000" rotWithShape="0">
+              <a:srgbClr val="000000">
+                <a:alpha val="38000"/>
+              </a:srgbClr>
+            </a:outerShdw>
+          </a:effectLst>
+        </a:effectStyle>
+        <a:effectStyle>
+          <a:effectLst>
+            <a:outerShdw blurRad="40000" dist="23000" dir="5400000" rotWithShape="0">
+              <a:srgbClr val="000000">
+                <a:alpha val="35000"/>
+              </a:srgbClr>
+            </a:outerShdw>
+          </a:effectLst>
+        </a:effectStyle>
+        <a:effectStyle>
+          <a:effectLst>
+            <a:outerShdw blurRad="40000" dist="23000" dir="5400000" rotWithShape="0">
+              <a:srgbClr val="000000">
+                <a:alpha val="35000"/>
+              </a:srgbClr>
+            </a:outerShdw>
+          </a:effectLst>
+          <a:scene3d>
+            <a:camera prst="orthographicFront">
+              <a:rot lat="0" lon="0" rev="0"/>
+            </a:camera>
+            <a:lightRig rig="threePt" dir="t">
+              <a:rot lat="0" lon="0" rev="1200000"/>
+            </a:lightRig>
+          </a:scene3d>
+          <a:sp3d>
+            <a:bevelT w="63500" h="25400"/>
+          </a:sp3d>
+        </a:effectStyle>
+      </a:effectStyleLst>
+      <a:bgFillStyleLst>
+        <a:solidFill>
+          <a:schemeClr val="phClr"/>
+        </a:solidFill>
+        <a:gradFill rotWithShape="1">
+          <a:gsLst>
+            <a:gs pos="0">
+              <a:schemeClr val="phClr">
+                <a:tint val="40000"/>
+                <a:satMod val="350000"/>
+              </a:schemeClr>
+            </a:gs>
+            <a:gs pos="40000">
+              <a:schemeClr val="phClr">
+                <a:tint val="45000"/>
+                <a:shade val="99000"/>
+                <a:satMod val="350000"/>
+              </a:schemeClr>
+            </a:gs>
+            <a:gs pos="100000">
+              <a:schemeClr val="phClr">
+                <a:shade val="20000"/>
+                <a:satMod val="255000"/>
+              </a:schemeClr>
+            </a:gs>
+          </a:gsLst>
+          <a:path path="circle">
+            <a:fillToRect l="50000" t="-80000" r="50000" b="180000"/>
+          </a:path>
+        </a:gradFill>
+        <a:gradFill rotWithShape="1">
+          <a:gsLst>
+            <a:gs pos="0">
+              <a:schemeClr val="phClr">
+                <a:tint val="80000"/>
+                <a:satMod val="300000"/>
+              </a:schemeClr>
+            </a:gs>
+            <a:gs pos="100000">
+              <a:schemeClr val="phClr">
+                <a:shade val="30000"/>
+                <a:satMod val="200000"/>
+              </a:schemeClr>
+            </a:gs>
+          </a:gsLst>
+          <a:path path="circle">
+            <a:fillToRect l="50000" t="50000" r="50000" b="50000"/>
+          </a:path>
+        </a:gradFill>
+      </a:bgFillStyleLst>
+    </a:fmtScheme>
+  </a:themeElements>
+</a:theme>
 </file>
</xml_diff>